<commit_message>
wip: ud from deeplearning.ai
</commit_message>
<xml_diff>
--- a/img/illustration/dtw.pptx
+++ b/img/illustration/dtw.pptx
@@ -3203,9 +3203,91 @@
           <a:chExt cx="0" cy="0"/>
         </a:xfrm>
       </p:grpSpPr>
+      <p:cxnSp>
+        <p:nvCxnSpPr>
+          <p:cNvPr id="4" name="" hidden="0"/>
+          <p:cNvCxnSpPr>
+            <a:cxnSpLocks/>
+          </p:cNvCxnSpPr>
+          <p:nvPr isPhoto="0" userDrawn="0"/>
+        </p:nvCxnSpPr>
+        <p:spPr bwMode="auto">
+          <a:xfrm rot="5399943" flipH="0" flipV="1">
+            <a:off x="3747508" y="1398267"/>
+            <a:ext cx="1111614" cy="281821"/>
+          </a:xfrm>
+          <a:prstGeom prst="line">
+            <a:avLst/>
+          </a:prstGeom>
+          <a:ln w="19049" cap="flat" cmpd="sng" algn="ctr">
+            <a:solidFill>
+              <a:srgbClr val="70AD47"/>
+            </a:solidFill>
+            <a:prstDash val="dash"/>
+            <a:miter/>
+          </a:ln>
+        </p:spPr>
+        <p:style>
+          <a:lnRef idx="1">
+            <a:schemeClr val="accent1">
+              <a:shade val="50000"/>
+            </a:schemeClr>
+          </a:lnRef>
+          <a:fillRef idx="0">
+            <a:schemeClr val="accent1"/>
+          </a:fillRef>
+          <a:effectRef idx="0">
+            <a:schemeClr val="accent1"/>
+          </a:effectRef>
+          <a:fontRef idx="minor">
+            <a:schemeClr val="tx1"/>
+          </a:fontRef>
+        </p:style>
+      </p:cxnSp>
+      <p:cxnSp>
+        <p:nvCxnSpPr>
+          <p:cNvPr id="5" name="" hidden="0"/>
+          <p:cNvCxnSpPr>
+            <a:cxnSpLocks/>
+          </p:cNvCxnSpPr>
+          <p:nvPr isPhoto="0" userDrawn="0"/>
+        </p:nvCxnSpPr>
+        <p:spPr bwMode="auto">
+          <a:xfrm rot="5399943" flipH="0" flipV="1">
+            <a:off x="3603867" y="1541909"/>
+            <a:ext cx="1117077" cy="0"/>
+          </a:xfrm>
+          <a:prstGeom prst="line">
+            <a:avLst/>
+          </a:prstGeom>
+          <a:ln w="19049" cap="flat" cmpd="sng" algn="ctr">
+            <a:solidFill>
+              <a:srgbClr val="70AD47"/>
+            </a:solidFill>
+            <a:prstDash val="dash"/>
+            <a:miter/>
+          </a:ln>
+        </p:spPr>
+        <p:style>
+          <a:lnRef idx="1">
+            <a:schemeClr val="accent1">
+              <a:shade val="50000"/>
+            </a:schemeClr>
+          </a:lnRef>
+          <a:fillRef idx="0">
+            <a:schemeClr val="accent1"/>
+          </a:fillRef>
+          <a:effectRef idx="0">
+            <a:schemeClr val="accent1"/>
+          </a:effectRef>
+          <a:fontRef idx="minor">
+            <a:schemeClr val="tx1"/>
+          </a:fontRef>
+        </p:style>
+      </p:cxnSp>
       <p:grpSp>
         <p:nvGrpSpPr>
-          <p:cNvPr id="4" name="" hidden="0"/>
+          <p:cNvPr id="6" name="" hidden="0"/>
           <p:cNvGrpSpPr/>
           <p:nvPr isPhoto="0" userDrawn="0"/>
         </p:nvGrpSpPr>
@@ -3219,7 +3301,7 @@
         </p:grpSpPr>
         <p:sp>
           <p:nvSpPr>
-            <p:cNvPr id="5" name="" hidden="0"/>
+            <p:cNvPr id="7" name="" hidden="0"/>
             <p:cNvSpPr/>
             <p:nvPr isPhoto="0" userDrawn="0"/>
           </p:nvSpPr>
@@ -3271,7 +3353,7 @@
         </p:sp>
         <p:sp>
           <p:nvSpPr>
-            <p:cNvPr id="6" name="" hidden="0"/>
+            <p:cNvPr id="8" name="" hidden="0"/>
             <p:cNvSpPr/>
             <p:nvPr isPhoto="0" userDrawn="0"/>
           </p:nvSpPr>
@@ -3318,7 +3400,7 @@
       </p:grpSp>
       <p:graphicFrame>
         <p:nvGraphicFramePr>
-          <p:cNvPr id="7" name="" hidden="0"/>
+          <p:cNvPr id="9" name="" hidden="0"/>
           <p:cNvGraphicFramePr>
             <a:graphicFrameLocks xmlns:a="http://schemas.openxmlformats.org/drawingml/2006/main"/>
           </p:cNvGraphicFramePr>
@@ -3332,7 +3414,7 @@
           <a:graphicData uri="http://schemas.openxmlformats.org/drawingml/2006/table">
             <a:tbl>
               <a:tblPr firstRow="1" firstCol="1" lastRow="0" lastCol="0" bandRow="1" bandCol="0">
-                <a:tableStyleId>{790215A8-643B-CFBB-2ECD-83C25B37E1BC}</a:tableStyleId>
+                <a:tableStyleId>{F9B0DE10-8A60-07E0-EA21-0246B84CAABC}</a:tableStyleId>
               </a:tblPr>
               <a:tblGrid>
                 <a:gridCol w="489699"/>
@@ -5590,280 +5672,1306 @@
           </a:graphicData>
         </a:graphic>
       </p:graphicFrame>
-      <p:cxnSp>
-        <p:nvCxnSpPr>
-          <p:cNvPr id="8" name="" hidden="0"/>
-          <p:cNvCxnSpPr>
-            <a:cxnSpLocks/>
-            <a:stCxn id="9" idx="2"/>
-            <a:endCxn id="10" idx="0"/>
-          </p:cNvCxnSpPr>
+      <p:sp>
+        <p:nvSpPr>
+          <p:cNvPr id="10" name="" hidden="0"/>
+          <p:cNvSpPr/>
           <p:nvPr isPhoto="0" userDrawn="0"/>
-        </p:nvCxnSpPr>
+        </p:nvSpPr>
         <p:spPr bwMode="auto">
-          <a:xfrm rot="5399978" flipH="0" flipV="1">
-            <a:off x="5915575" y="2580552"/>
-            <a:ext cx="1111615" cy="281822"/>
+          <a:xfrm flipH="0" flipV="0">
+            <a:off x="1514962" y="5611584"/>
+            <a:ext cx="838686" cy="430529"/>
           </a:xfrm>
-          <a:prstGeom prst="line">
+          <a:prstGeom prst="rect">
             <a:avLst/>
           </a:prstGeom>
-          <a:ln w="19049" cap="flat" cmpd="sng" algn="ctr">
-            <a:solidFill>
-              <a:srgbClr val="70AD47"/>
-            </a:solidFill>
-            <a:prstDash val="dash"/>
-            <a:miter/>
-          </a:ln>
+          <a:noFill/>
         </p:spPr>
-        <p:style>
-          <a:lnRef idx="1">
-            <a:schemeClr val="accent1">
-              <a:shade val="50000"/>
-            </a:schemeClr>
-          </a:lnRef>
-          <a:fillRef idx="0">
-            <a:schemeClr val="accent1"/>
-          </a:fillRef>
-          <a:effectRef idx="0">
-            <a:schemeClr val="accent1"/>
-          </a:effectRef>
-          <a:fontRef idx="minor">
-            <a:schemeClr val="tx1"/>
-          </a:fontRef>
-        </p:style>
-      </p:cxnSp>
-      <p:cxnSp>
-        <p:nvCxnSpPr>
+        <p:txBody>
+          <a:bodyPr vertOverflow="overflow" horzOverflow="clip" vert="horz" wrap="square" lIns="91440" tIns="45720" rIns="91440" bIns="45720" numCol="1" spcCol="0" rtlCol="0" fromWordArt="0" anchor="ctr" anchorCtr="0" forceAA="0" upright="0" compatLnSpc="0">
+            <a:noAutofit/>
+          </a:bodyPr>
+          <a:p>
+            <a:pPr algn="ctr">
+              <a:defRPr/>
+            </a:pPr>
+            <a:r>
+              <a:rPr b="1">
+                <a:solidFill>
+                  <a:schemeClr val="accent6"/>
+                </a:solidFill>
+                <a:latin typeface="Poppins"/>
+                <a:ea typeface="Poppins"/>
+                <a:cs typeface="Poppins"/>
+              </a:rPr>
+              <a:t>start</a:t>
+            </a:r>
+            <a:endParaRPr b="1">
+              <a:solidFill>
+                <a:schemeClr val="accent6"/>
+              </a:solidFill>
+              <a:latin typeface="Poppins"/>
+              <a:ea typeface="Poppins"/>
+              <a:cs typeface="Poppins"/>
+            </a:endParaRPr>
+          </a:p>
+        </p:txBody>
+      </p:sp>
+      <p:sp>
+        <p:nvSpPr>
           <p:cNvPr id="11" name="" hidden="0"/>
-          <p:cNvCxnSpPr>
-            <a:cxnSpLocks/>
-            <a:stCxn id="12" idx="2"/>
-            <a:endCxn id="13" idx="0"/>
-          </p:cNvCxnSpPr>
+          <p:cNvSpPr/>
           <p:nvPr isPhoto="0" userDrawn="0"/>
-        </p:nvCxnSpPr>
+        </p:nvSpPr>
         <p:spPr bwMode="auto">
-          <a:xfrm rot="5399978" flipH="0" flipV="1">
-            <a:off x="6211339" y="2004762"/>
-            <a:ext cx="1092060" cy="293253"/>
+          <a:xfrm flipH="0" flipV="0">
+            <a:off x="1617833" y="5255645"/>
+            <a:ext cx="217895" cy="274356"/>
           </a:xfrm>
-          <a:prstGeom prst="line">
+          <a:prstGeom prst="rect">
             <a:avLst/>
           </a:prstGeom>
-          <a:ln w="19049" cap="flat" cmpd="sng" algn="ctr">
-            <a:solidFill>
-              <a:srgbClr val="70AD47"/>
-            </a:solidFill>
-            <a:prstDash val="dash"/>
-            <a:miter/>
-          </a:ln>
+          <a:noFill/>
         </p:spPr>
-        <p:style>
-          <a:lnRef idx="1">
-            <a:schemeClr val="accent1">
-              <a:shade val="50000"/>
-            </a:schemeClr>
-          </a:lnRef>
-          <a:fillRef idx="0">
-            <a:schemeClr val="accent1"/>
-          </a:fillRef>
-          <a:effectRef idx="0">
-            <a:schemeClr val="accent1"/>
-          </a:effectRef>
-          <a:fontRef idx="minor">
-            <a:schemeClr val="tx1"/>
-          </a:fontRef>
-        </p:style>
-      </p:cxnSp>
-      <p:cxnSp>
-        <p:nvCxnSpPr>
-          <p:cNvPr id="14" name="" hidden="0"/>
-          <p:cNvCxnSpPr>
-            <a:cxnSpLocks/>
-            <a:stCxn id="15" idx="2"/>
-            <a:endCxn id="16" idx="1"/>
-          </p:cNvCxnSpPr>
+        <p:txBody>
+          <a:bodyPr vertOverflow="overflow" horzOverflow="clip" vert="horz" wrap="square" lIns="91440" tIns="45720" rIns="91440" bIns="45720" numCol="1" spcCol="0" rtlCol="0" fromWordArt="0" anchor="t" anchorCtr="0" forceAA="0" upright="0" compatLnSpc="0">
+            <a:noAutofit/>
+          </a:bodyPr>
+          <a:p>
+            <a:pPr algn="l">
+              <a:defRPr/>
+            </a:pPr>
+            <a:r>
+              <a:rPr sz="1200" b="0">
+                <a:solidFill>
+                  <a:srgbClr val="FF008C"/>
+                </a:solidFill>
+                <a:latin typeface="Poppins"/>
+                <a:ea typeface="Poppins"/>
+                <a:cs typeface="Poppins"/>
+              </a:rPr>
+              <a:t>1</a:t>
+            </a:r>
+            <a:endParaRPr>
+              <a:solidFill>
+                <a:srgbClr val="FF008C"/>
+              </a:solidFill>
+            </a:endParaRPr>
+          </a:p>
+        </p:txBody>
+      </p:sp>
+      <p:sp>
+        <p:nvSpPr>
+          <p:cNvPr id="12" name="" hidden="0"/>
+          <p:cNvSpPr/>
           <p:nvPr isPhoto="0" userDrawn="0"/>
-        </p:nvCxnSpPr>
+        </p:nvSpPr>
         <p:spPr bwMode="auto">
-          <a:xfrm rot="5399978" flipH="0" flipV="1">
-            <a:off x="6496687" y="2587765"/>
-            <a:ext cx="1109217" cy="264995"/>
+          <a:xfrm flipH="0" flipV="0">
+            <a:off x="1617833" y="4897172"/>
+            <a:ext cx="217895" cy="274356"/>
           </a:xfrm>
-          <a:prstGeom prst="line">
+          <a:prstGeom prst="rect">
             <a:avLst/>
           </a:prstGeom>
-          <a:ln w="19049" cap="flat" cmpd="sng" algn="ctr">
-            <a:solidFill>
-              <a:srgbClr val="70AD47"/>
-            </a:solidFill>
-            <a:prstDash val="dash"/>
-            <a:miter/>
-          </a:ln>
+          <a:noFill/>
         </p:spPr>
-        <p:style>
-          <a:lnRef idx="1">
-            <a:schemeClr val="accent1">
-              <a:shade val="50000"/>
-            </a:schemeClr>
-          </a:lnRef>
-          <a:fillRef idx="0">
-            <a:schemeClr val="accent1"/>
-          </a:fillRef>
-          <a:effectRef idx="0">
-            <a:schemeClr val="accent1"/>
-          </a:effectRef>
-          <a:fontRef idx="minor">
-            <a:schemeClr val="tx1"/>
-          </a:fontRef>
-        </p:style>
-      </p:cxnSp>
-      <p:cxnSp>
-        <p:nvCxnSpPr>
-          <p:cNvPr id="17" name="" hidden="0"/>
-          <p:cNvCxnSpPr>
-            <a:cxnSpLocks/>
-            <a:endCxn id="18" idx="0"/>
-          </p:cNvCxnSpPr>
+        <p:txBody>
+          <a:bodyPr vertOverflow="overflow" horzOverflow="clip" vert="horz" wrap="square" lIns="91440" tIns="45720" rIns="91440" bIns="45720" numCol="1" spcCol="0" rtlCol="0" fromWordArt="0" anchor="t" anchorCtr="0" forceAA="0" upright="0" compatLnSpc="0">
+            <a:noAutofit/>
+          </a:bodyPr>
+          <a:p>
+            <a:pPr algn="l">
+              <a:defRPr/>
+            </a:pPr>
+            <a:r>
+              <a:rPr sz="1200">
+                <a:solidFill>
+                  <a:srgbClr val="FF008C"/>
+                </a:solidFill>
+              </a:rPr>
+              <a:t>2</a:t>
+            </a:r>
+            <a:endParaRPr sz="1200">
+              <a:solidFill>
+                <a:srgbClr val="FF008C"/>
+              </a:solidFill>
+            </a:endParaRPr>
+          </a:p>
+        </p:txBody>
+      </p:sp>
+      <p:sp>
+        <p:nvSpPr>
+          <p:cNvPr id="13" name="" hidden="0"/>
+          <p:cNvSpPr/>
           <p:nvPr isPhoto="0" userDrawn="0"/>
-        </p:nvCxnSpPr>
+        </p:nvSpPr>
         <p:spPr bwMode="auto">
-          <a:xfrm rot="5399978" flipH="0" flipV="1">
-            <a:off x="6759896" y="2279475"/>
-            <a:ext cx="1127590" cy="279798"/>
+          <a:xfrm flipH="0" flipV="0">
+            <a:off x="2110469" y="4559927"/>
+            <a:ext cx="217895" cy="274356"/>
           </a:xfrm>
-          <a:prstGeom prst="line">
+          <a:prstGeom prst="rect">
             <a:avLst/>
           </a:prstGeom>
-          <a:ln w="19049" cap="flat" cmpd="sng" algn="ctr">
-            <a:solidFill>
-              <a:srgbClr val="70AD47"/>
-            </a:solidFill>
-            <a:prstDash val="dash"/>
-            <a:miter/>
-          </a:ln>
+          <a:noFill/>
         </p:spPr>
-        <p:style>
-          <a:lnRef idx="1">
-            <a:schemeClr val="accent1">
-              <a:shade val="50000"/>
-            </a:schemeClr>
-          </a:lnRef>
-          <a:fillRef idx="0">
-            <a:schemeClr val="accent1"/>
-          </a:fillRef>
-          <a:effectRef idx="0">
-            <a:schemeClr val="accent1"/>
-          </a:effectRef>
-          <a:fontRef idx="minor">
-            <a:schemeClr val="tx1"/>
-          </a:fontRef>
-        </p:style>
-      </p:cxnSp>
-      <p:cxnSp>
-        <p:nvCxnSpPr>
-          <p:cNvPr id="19" name="" hidden="0"/>
-          <p:cNvCxnSpPr>
-            <a:cxnSpLocks/>
-            <a:stCxn id="20" idx="2"/>
-            <a:endCxn id="21" idx="1"/>
-          </p:cNvCxnSpPr>
+        <p:txBody>
+          <a:bodyPr vertOverflow="overflow" horzOverflow="clip" vert="horz" wrap="square" lIns="91440" tIns="45720" rIns="91440" bIns="45720" numCol="1" spcCol="0" rtlCol="0" fromWordArt="0" anchor="t" anchorCtr="0" forceAA="0" upright="0" compatLnSpc="0">
+            <a:noAutofit/>
+          </a:bodyPr>
+          <a:p>
+            <a:pPr algn="l">
+              <a:defRPr/>
+            </a:pPr>
+            <a:r>
+              <a:rPr sz="1200">
+                <a:solidFill>
+                  <a:srgbClr val="FF008C"/>
+                </a:solidFill>
+              </a:rPr>
+              <a:t>3</a:t>
+            </a:r>
+            <a:endParaRPr sz="1200">
+              <a:solidFill>
+                <a:srgbClr val="FF008C"/>
+              </a:solidFill>
+            </a:endParaRPr>
+          </a:p>
+        </p:txBody>
+      </p:sp>
+      <p:sp>
+        <p:nvSpPr>
+          <p:cNvPr id="14" name="" hidden="0"/>
+          <p:cNvSpPr/>
           <p:nvPr isPhoto="0" userDrawn="0"/>
-        </p:nvCxnSpPr>
+        </p:nvSpPr>
         <p:spPr bwMode="auto">
-          <a:xfrm rot="5399978" flipH="0" flipV="1">
-            <a:off x="7062593" y="2582171"/>
-            <a:ext cx="1109217" cy="276184"/>
+          <a:xfrm flipH="0" flipV="0">
+            <a:off x="2610531" y="4186032"/>
+            <a:ext cx="217895" cy="274356"/>
           </a:xfrm>
-          <a:prstGeom prst="line">
+          <a:prstGeom prst="rect">
             <a:avLst/>
           </a:prstGeom>
-          <a:ln w="19049" cap="flat" cmpd="sng" algn="ctr">
-            <a:solidFill>
-              <a:srgbClr val="70AD47"/>
-            </a:solidFill>
-            <a:prstDash val="dash"/>
-            <a:miter/>
-          </a:ln>
+          <a:noFill/>
         </p:spPr>
-        <p:style>
-          <a:lnRef idx="1">
-            <a:schemeClr val="accent1">
-              <a:shade val="50000"/>
-            </a:schemeClr>
-          </a:lnRef>
-          <a:fillRef idx="0">
-            <a:schemeClr val="accent1"/>
-          </a:fillRef>
-          <a:effectRef idx="0">
-            <a:schemeClr val="accent1"/>
-          </a:effectRef>
-          <a:fontRef idx="minor">
-            <a:schemeClr val="tx1"/>
-          </a:fontRef>
-        </p:style>
-      </p:cxnSp>
-      <p:cxnSp>
-        <p:nvCxnSpPr>
-          <p:cNvPr id="22" name="" hidden="0"/>
-          <p:cNvCxnSpPr>
-            <a:cxnSpLocks/>
-            <a:stCxn id="23" idx="2"/>
-            <a:endCxn id="21" idx="0"/>
-          </p:cNvCxnSpPr>
+        <p:txBody>
+          <a:bodyPr vertOverflow="overflow" horzOverflow="clip" vert="horz" wrap="square" lIns="91440" tIns="45720" rIns="91440" bIns="45720" numCol="1" spcCol="0" rtlCol="0" fromWordArt="0" anchor="t" anchorCtr="0" forceAA="0" upright="0" compatLnSpc="0">
+            <a:noAutofit/>
+          </a:bodyPr>
+          <a:p>
+            <a:pPr algn="l">
+              <a:defRPr/>
+            </a:pPr>
+            <a:r>
+              <a:rPr sz="1200" b="0">
+                <a:solidFill>
+                  <a:srgbClr val="FF008C"/>
+                </a:solidFill>
+                <a:latin typeface="Poppins"/>
+                <a:ea typeface="Poppins"/>
+                <a:cs typeface="Poppins"/>
+              </a:rPr>
+              <a:t>4</a:t>
+            </a:r>
+            <a:endParaRPr>
+              <a:solidFill>
+                <a:srgbClr val="FF008C"/>
+              </a:solidFill>
+            </a:endParaRPr>
+          </a:p>
+        </p:txBody>
+      </p:sp>
+      <p:sp>
+        <p:nvSpPr>
+          <p:cNvPr id="15" name="" hidden="0"/>
+          <p:cNvSpPr/>
           <p:nvPr isPhoto="0" userDrawn="0"/>
-        </p:nvCxnSpPr>
+        </p:nvSpPr>
         <p:spPr bwMode="auto">
-          <a:xfrm rot="5399978" flipH="0" flipV="1">
-            <a:off x="7359557" y="2593386"/>
-            <a:ext cx="1103266" cy="247801"/>
+          <a:xfrm flipH="0" flipV="0">
+            <a:off x="3101812" y="3827634"/>
+            <a:ext cx="217895" cy="274356"/>
           </a:xfrm>
-          <a:prstGeom prst="line">
+          <a:prstGeom prst="rect">
             <a:avLst/>
           </a:prstGeom>
-          <a:ln w="19049" cap="flat" cmpd="sng" algn="ctr">
-            <a:solidFill>
-              <a:srgbClr val="70AD47"/>
-            </a:solidFill>
-            <a:prstDash val="dash"/>
-            <a:miter/>
-          </a:ln>
+          <a:noFill/>
         </p:spPr>
-        <p:style>
-          <a:lnRef idx="1">
-            <a:schemeClr val="accent1">
-              <a:shade val="50000"/>
-            </a:schemeClr>
-          </a:lnRef>
-          <a:fillRef idx="0">
-            <a:schemeClr val="accent1"/>
-          </a:fillRef>
-          <a:effectRef idx="0">
-            <a:schemeClr val="accent1"/>
-          </a:effectRef>
-          <a:fontRef idx="minor">
-            <a:schemeClr val="tx1"/>
-          </a:fontRef>
-        </p:style>
-      </p:cxnSp>
+        <p:txBody>
+          <a:bodyPr vertOverflow="overflow" horzOverflow="clip" vert="horz" wrap="square" lIns="91440" tIns="45720" rIns="91440" bIns="45720" numCol="1" spcCol="0" rtlCol="0" fromWordArt="0" anchor="t" anchorCtr="0" forceAA="0" upright="0" compatLnSpc="0">
+            <a:noAutofit/>
+          </a:bodyPr>
+          <a:p>
+            <a:pPr algn="l">
+              <a:defRPr/>
+            </a:pPr>
+            <a:r>
+              <a:rPr sz="1200">
+                <a:solidFill>
+                  <a:srgbClr val="FF008C"/>
+                </a:solidFill>
+              </a:rPr>
+              <a:t>5</a:t>
+            </a:r>
+            <a:endParaRPr sz="1200">
+              <a:solidFill>
+                <a:srgbClr val="FF008C"/>
+              </a:solidFill>
+            </a:endParaRPr>
+          </a:p>
+        </p:txBody>
+      </p:sp>
+      <p:sp>
+        <p:nvSpPr>
+          <p:cNvPr id="16" name="" hidden="0"/>
+          <p:cNvSpPr/>
+          <p:nvPr isPhoto="0" userDrawn="0"/>
+        </p:nvSpPr>
+        <p:spPr bwMode="auto">
+          <a:xfrm flipH="0" flipV="0">
+            <a:off x="3601874" y="3455889"/>
+            <a:ext cx="217895" cy="274356"/>
+          </a:xfrm>
+          <a:prstGeom prst="rect">
+            <a:avLst/>
+          </a:prstGeom>
+          <a:noFill/>
+        </p:spPr>
+        <p:txBody>
+          <a:bodyPr vertOverflow="overflow" horzOverflow="clip" vert="horz" wrap="square" lIns="91440" tIns="45720" rIns="91440" bIns="45720" numCol="1" spcCol="0" rtlCol="0" fromWordArt="0" anchor="t" anchorCtr="0" forceAA="0" upright="0" compatLnSpc="0">
+            <a:noAutofit/>
+          </a:bodyPr>
+          <a:p>
+            <a:pPr algn="l">
+              <a:defRPr/>
+            </a:pPr>
+            <a:r>
+              <a:rPr sz="1200">
+                <a:solidFill>
+                  <a:srgbClr val="FF008C"/>
+                </a:solidFill>
+              </a:rPr>
+              <a:t>6</a:t>
+            </a:r>
+            <a:endParaRPr sz="1200">
+              <a:solidFill>
+                <a:srgbClr val="FF008C"/>
+              </a:solidFill>
+            </a:endParaRPr>
+          </a:p>
+        </p:txBody>
+      </p:sp>
+      <p:sp>
+        <p:nvSpPr>
+          <p:cNvPr id="17" name="" hidden="0"/>
+          <p:cNvSpPr/>
+          <p:nvPr isPhoto="0" userDrawn="0"/>
+        </p:nvSpPr>
+        <p:spPr bwMode="auto">
+          <a:xfrm flipH="0" flipV="0">
+            <a:off x="4101937" y="3107180"/>
+            <a:ext cx="217895" cy="274356"/>
+          </a:xfrm>
+          <a:prstGeom prst="rect">
+            <a:avLst/>
+          </a:prstGeom>
+          <a:noFill/>
+        </p:spPr>
+        <p:txBody>
+          <a:bodyPr vertOverflow="overflow" horzOverflow="clip" vert="horz" wrap="square" lIns="91440" tIns="45720" rIns="91440" bIns="45720" numCol="1" spcCol="0" rtlCol="0" fromWordArt="0" anchor="t" anchorCtr="0" forceAA="0" upright="0" compatLnSpc="0">
+            <a:noAutofit/>
+          </a:bodyPr>
+          <a:p>
+            <a:pPr algn="l">
+              <a:defRPr/>
+            </a:pPr>
+            <a:r>
+              <a:rPr sz="1200">
+                <a:solidFill>
+                  <a:srgbClr val="FF008C"/>
+                </a:solidFill>
+              </a:rPr>
+              <a:t>7</a:t>
+            </a:r>
+            <a:endParaRPr sz="1200">
+              <a:solidFill>
+                <a:srgbClr val="FF008C"/>
+              </a:solidFill>
+            </a:endParaRPr>
+          </a:p>
+        </p:txBody>
+      </p:sp>
       <p:grpSp>
         <p:nvGrpSpPr>
-          <p:cNvPr id="24" name="" hidden="0"/>
+          <p:cNvPr id="18" name="" hidden="0"/>
           <p:cNvGrpSpPr/>
           <p:nvPr isPhoto="0" userDrawn="0"/>
         </p:nvGrpSpPr>
         <p:grpSpPr bwMode="auto">
-          <a:xfrm rot="0" flipH="0" flipV="0">
-            <a:off x="6171220" y="1291302"/>
-            <a:ext cx="2274901" cy="1063261"/>
+          <a:xfrm>
+            <a:off x="6689772" y="2976248"/>
+            <a:ext cx="2280100" cy="2317525"/>
             <a:chOff x="0" y="0"/>
-            <a:chExt cx="2274901" cy="1063261"/>
+            <a:chExt cx="2280100" cy="2317525"/>
           </a:xfrm>
         </p:grpSpPr>
         <p:cxnSp>
           <p:nvCxnSpPr>
+            <p:cNvPr id="19" name="" hidden="0"/>
+            <p:cNvCxnSpPr>
+              <a:cxnSpLocks/>
+              <a:stCxn id="20" idx="2"/>
+              <a:endCxn id="21" idx="0"/>
+            </p:cNvCxnSpPr>
+            <p:nvPr isPhoto="0" userDrawn="0"/>
+          </p:nvCxnSpPr>
+          <p:spPr bwMode="auto">
+            <a:xfrm rot="5399977" flipH="0" flipV="1">
+              <a:off x="-250446" y="1295268"/>
+              <a:ext cx="1111615" cy="281822"/>
+            </a:xfrm>
+            <a:prstGeom prst="line">
+              <a:avLst/>
+            </a:prstGeom>
+            <a:ln w="19049" cap="flat" cmpd="sng" algn="ctr">
+              <a:solidFill>
+                <a:srgbClr val="70AD47"/>
+              </a:solidFill>
+              <a:prstDash val="dash"/>
+              <a:miter/>
+            </a:ln>
+          </p:spPr>
+          <p:style>
+            <a:lnRef idx="1">
+              <a:schemeClr val="accent1">
+                <a:shade val="50000"/>
+              </a:schemeClr>
+            </a:lnRef>
+            <a:fillRef idx="0">
+              <a:schemeClr val="accent1"/>
+            </a:fillRef>
+            <a:effectRef idx="0">
+              <a:schemeClr val="accent1"/>
+            </a:effectRef>
+            <a:fontRef idx="minor">
+              <a:schemeClr val="tx1"/>
+            </a:fontRef>
+          </p:style>
+        </p:cxnSp>
+        <p:cxnSp>
+          <p:nvCxnSpPr>
+            <p:cNvPr id="22" name="" hidden="0"/>
+            <p:cNvCxnSpPr>
+              <a:cxnSpLocks/>
+              <a:stCxn id="23" idx="2"/>
+              <a:endCxn id="24" idx="0"/>
+            </p:cNvCxnSpPr>
+            <p:nvPr isPhoto="0" userDrawn="0"/>
+          </p:nvCxnSpPr>
+          <p:spPr bwMode="auto">
+            <a:xfrm rot="5399977" flipH="0" flipV="1">
+              <a:off x="45318" y="719477"/>
+              <a:ext cx="1092060" cy="293253"/>
+            </a:xfrm>
+            <a:prstGeom prst="line">
+              <a:avLst/>
+            </a:prstGeom>
+            <a:ln w="19049" cap="flat" cmpd="sng" algn="ctr">
+              <a:solidFill>
+                <a:srgbClr val="70AD47"/>
+              </a:solidFill>
+              <a:prstDash val="dash"/>
+              <a:miter/>
+            </a:ln>
+          </p:spPr>
+          <p:style>
+            <a:lnRef idx="1">
+              <a:schemeClr val="accent1">
+                <a:shade val="50000"/>
+              </a:schemeClr>
+            </a:lnRef>
+            <a:fillRef idx="0">
+              <a:schemeClr val="accent1"/>
+            </a:fillRef>
+            <a:effectRef idx="0">
+              <a:schemeClr val="accent1"/>
+            </a:effectRef>
+            <a:fontRef idx="minor">
+              <a:schemeClr val="tx1"/>
+            </a:fontRef>
+          </p:style>
+        </p:cxnSp>
+        <p:cxnSp>
+          <p:nvCxnSpPr>
             <p:cNvPr id="25" name="" hidden="0"/>
+            <p:cNvCxnSpPr>
+              <a:cxnSpLocks/>
+              <a:stCxn id="26" idx="2"/>
+              <a:endCxn id="27" idx="1"/>
+            </p:cNvCxnSpPr>
+            <p:nvPr isPhoto="0" userDrawn="0"/>
+          </p:nvCxnSpPr>
+          <p:spPr bwMode="auto">
+            <a:xfrm rot="5399977" flipH="0" flipV="1">
+              <a:off x="330664" y="1302482"/>
+              <a:ext cx="1109217" cy="264995"/>
+            </a:xfrm>
+            <a:prstGeom prst="line">
+              <a:avLst/>
+            </a:prstGeom>
+            <a:ln w="19049" cap="flat" cmpd="sng" algn="ctr">
+              <a:solidFill>
+                <a:srgbClr val="70AD47"/>
+              </a:solidFill>
+              <a:prstDash val="dash"/>
+              <a:miter/>
+            </a:ln>
+          </p:spPr>
+          <p:style>
+            <a:lnRef idx="1">
+              <a:schemeClr val="accent1">
+                <a:shade val="50000"/>
+              </a:schemeClr>
+            </a:lnRef>
+            <a:fillRef idx="0">
+              <a:schemeClr val="accent1"/>
+            </a:fillRef>
+            <a:effectRef idx="0">
+              <a:schemeClr val="accent1"/>
+            </a:effectRef>
+            <a:fontRef idx="minor">
+              <a:schemeClr val="tx1"/>
+            </a:fontRef>
+          </p:style>
+        </p:cxnSp>
+        <p:cxnSp>
+          <p:nvCxnSpPr>
+            <p:cNvPr id="28" name="" hidden="0"/>
+            <p:cNvCxnSpPr>
+              <a:cxnSpLocks/>
+              <a:endCxn id="29" idx="0"/>
+            </p:cNvCxnSpPr>
+            <p:nvPr isPhoto="0" userDrawn="0"/>
+          </p:nvCxnSpPr>
+          <p:spPr bwMode="auto">
+            <a:xfrm rot="5399977" flipH="0" flipV="1">
+              <a:off x="593875" y="994191"/>
+              <a:ext cx="1127590" cy="279798"/>
+            </a:xfrm>
+            <a:prstGeom prst="line">
+              <a:avLst/>
+            </a:prstGeom>
+            <a:ln w="19049" cap="flat" cmpd="sng" algn="ctr">
+              <a:solidFill>
+                <a:srgbClr val="70AD47"/>
+              </a:solidFill>
+              <a:prstDash val="dash"/>
+              <a:miter/>
+            </a:ln>
+          </p:spPr>
+          <p:style>
+            <a:lnRef idx="1">
+              <a:schemeClr val="accent1">
+                <a:shade val="50000"/>
+              </a:schemeClr>
+            </a:lnRef>
+            <a:fillRef idx="0">
+              <a:schemeClr val="accent1"/>
+            </a:fillRef>
+            <a:effectRef idx="0">
+              <a:schemeClr val="accent1"/>
+            </a:effectRef>
+            <a:fontRef idx="minor">
+              <a:schemeClr val="tx1"/>
+            </a:fontRef>
+          </p:style>
+        </p:cxnSp>
+        <p:cxnSp>
+          <p:nvCxnSpPr>
+            <p:cNvPr id="30" name="" hidden="0"/>
+            <p:cNvCxnSpPr>
+              <a:cxnSpLocks/>
+              <a:stCxn id="31" idx="2"/>
+              <a:endCxn id="32" idx="1"/>
+            </p:cNvCxnSpPr>
+            <p:nvPr isPhoto="0" userDrawn="0"/>
+          </p:nvCxnSpPr>
+          <p:spPr bwMode="auto">
+            <a:xfrm rot="5399977" flipH="0" flipV="1">
+              <a:off x="896571" y="1296887"/>
+              <a:ext cx="1109217" cy="276184"/>
+            </a:xfrm>
+            <a:prstGeom prst="line">
+              <a:avLst/>
+            </a:prstGeom>
+            <a:ln w="19049" cap="flat" cmpd="sng" algn="ctr">
+              <a:solidFill>
+                <a:srgbClr val="70AD47"/>
+              </a:solidFill>
+              <a:prstDash val="dash"/>
+              <a:miter/>
+            </a:ln>
+          </p:spPr>
+          <p:style>
+            <a:lnRef idx="1">
+              <a:schemeClr val="accent1">
+                <a:shade val="50000"/>
+              </a:schemeClr>
+            </a:lnRef>
+            <a:fillRef idx="0">
+              <a:schemeClr val="accent1"/>
+            </a:fillRef>
+            <a:effectRef idx="0">
+              <a:schemeClr val="accent1"/>
+            </a:effectRef>
+            <a:fontRef idx="minor">
+              <a:schemeClr val="tx1"/>
+            </a:fontRef>
+          </p:style>
+        </p:cxnSp>
+        <p:cxnSp>
+          <p:nvCxnSpPr>
+            <p:cNvPr id="33" name="" hidden="0"/>
+            <p:cNvCxnSpPr>
+              <a:cxnSpLocks/>
+              <a:stCxn id="34" idx="2"/>
+              <a:endCxn id="32" idx="0"/>
+            </p:cNvCxnSpPr>
+            <p:nvPr isPhoto="0" userDrawn="0"/>
+          </p:nvCxnSpPr>
+          <p:spPr bwMode="auto">
+            <a:xfrm rot="5399977" flipH="0" flipV="1">
+              <a:off x="1193535" y="1308103"/>
+              <a:ext cx="1103266" cy="247801"/>
+            </a:xfrm>
+            <a:prstGeom prst="line">
+              <a:avLst/>
+            </a:prstGeom>
+            <a:ln w="19049" cap="flat" cmpd="sng" algn="ctr">
+              <a:solidFill>
+                <a:srgbClr val="70AD47"/>
+              </a:solidFill>
+              <a:prstDash val="dash"/>
+              <a:miter/>
+            </a:ln>
+          </p:spPr>
+          <p:style>
+            <a:lnRef idx="1">
+              <a:schemeClr val="accent1">
+                <a:shade val="50000"/>
+              </a:schemeClr>
+            </a:lnRef>
+            <a:fillRef idx="0">
+              <a:schemeClr val="accent1"/>
+            </a:fillRef>
+            <a:effectRef idx="0">
+              <a:schemeClr val="accent1"/>
+            </a:effectRef>
+            <a:fontRef idx="minor">
+              <a:schemeClr val="tx1"/>
+            </a:fontRef>
+          </p:style>
+        </p:cxnSp>
+        <p:grpSp>
+          <p:nvGrpSpPr>
+            <p:cNvPr id="35" name="" hidden="0"/>
+            <p:cNvGrpSpPr/>
+            <p:nvPr isPhoto="0" userDrawn="0"/>
+          </p:nvGrpSpPr>
+          <p:grpSpPr bwMode="auto">
+            <a:xfrm rot="0" flipH="0" flipV="0">
+              <a:off x="5198" y="6019"/>
+              <a:ext cx="2274901" cy="1063261"/>
+              <a:chOff x="0" y="0"/>
+              <a:chExt cx="2274901" cy="1063261"/>
+            </a:xfrm>
+          </p:grpSpPr>
+          <p:cxnSp>
+            <p:nvCxnSpPr>
+              <p:cNvPr id="36" name="" hidden="0"/>
+              <p:cNvCxnSpPr>
+                <a:cxnSpLocks/>
+              </p:cNvCxnSpPr>
+              <p:nvPr isPhoto="0" userDrawn="0"/>
+            </p:nvCxnSpPr>
+            <p:spPr bwMode="auto">
+              <a:xfrm rot="0" flipH="0" flipV="0">
+                <a:off x="0" y="1063261"/>
+                <a:ext cx="2274901" cy="0"/>
+              </a:xfrm>
+              <a:prstGeom prst="line">
+                <a:avLst/>
+              </a:prstGeom>
+              <a:ln w="12699" cap="flat" cmpd="sng" algn="ctr">
+                <a:solidFill>
+                  <a:schemeClr val="tx1">
+                    <a:lumMod val="65098"/>
+                    <a:lumOff val="34902"/>
+                  </a:schemeClr>
+                </a:solidFill>
+                <a:prstDash val="solid"/>
+                <a:miter/>
+                <a:tailEnd type="arrow" len="med"/>
+              </a:ln>
+            </p:spPr>
+            <p:style>
+              <a:lnRef idx="1">
+                <a:schemeClr val="accent1">
+                  <a:shade val="50000"/>
+                </a:schemeClr>
+              </a:lnRef>
+              <a:fillRef idx="0">
+                <a:schemeClr val="accent1"/>
+              </a:fillRef>
+              <a:effectRef idx="0">
+                <a:schemeClr val="accent1"/>
+              </a:effectRef>
+              <a:fontRef idx="minor">
+                <a:schemeClr val="tx1"/>
+              </a:fontRef>
+            </p:style>
+          </p:cxnSp>
+          <p:cxnSp>
+            <p:nvCxnSpPr>
+              <p:cNvPr id="37" name="" hidden="0"/>
+              <p:cNvCxnSpPr>
+                <a:cxnSpLocks/>
+              </p:cNvCxnSpPr>
+              <p:nvPr isPhoto="0" userDrawn="0"/>
+            </p:nvCxnSpPr>
+            <p:spPr bwMode="auto">
+              <a:xfrm rot="16199969" flipH="0" flipV="0">
+                <a:off x="-531629" y="531630"/>
+                <a:ext cx="1063260" cy="0"/>
+              </a:xfrm>
+              <a:prstGeom prst="line">
+                <a:avLst/>
+              </a:prstGeom>
+              <a:ln w="12699" cap="flat" cmpd="sng" algn="ctr">
+                <a:solidFill>
+                  <a:schemeClr val="tx1">
+                    <a:lumMod val="65098"/>
+                    <a:lumOff val="34902"/>
+                  </a:schemeClr>
+                </a:solidFill>
+                <a:prstDash val="solid"/>
+                <a:miter/>
+                <a:tailEnd type="arrow" len="med"/>
+              </a:ln>
+            </p:spPr>
+            <p:style>
+              <a:lnRef idx="1">
+                <a:schemeClr val="accent1">
+                  <a:shade val="50000"/>
+                </a:schemeClr>
+              </a:lnRef>
+              <a:fillRef idx="0">
+                <a:schemeClr val="accent1"/>
+              </a:fillRef>
+              <a:effectRef idx="0">
+                <a:schemeClr val="accent1"/>
+              </a:effectRef>
+              <a:fontRef idx="minor">
+                <a:schemeClr val="tx1"/>
+              </a:fontRef>
+            </p:style>
+          </p:cxnSp>
+          <p:sp>
+            <p:nvSpPr>
+              <p:cNvPr id="38" name="" hidden="0"/>
+              <p:cNvSpPr/>
+              <p:nvPr isPhoto="0" userDrawn="0"/>
+            </p:nvSpPr>
+            <p:spPr bwMode="auto">
+              <a:xfrm rot="0" flipH="0" flipV="0">
+                <a:off x="110970" y="813576"/>
+                <a:ext cx="110970" cy="110970"/>
+              </a:xfrm>
+              <a:prstGeom prst="ellipse">
+                <a:avLst/>
+              </a:prstGeom>
+              <a:solidFill>
+                <a:schemeClr val="accent4"/>
+              </a:solidFill>
+              <a:ln w="12700" cap="flat" cmpd="sng" algn="ctr">
+                <a:noFill/>
+                <a:prstDash val="solid"/>
+                <a:miter/>
+              </a:ln>
+            </p:spPr>
+            <p:style>
+              <a:lnRef idx="2">
+                <a:schemeClr val="accent1">
+                  <a:shade val="50000"/>
+                </a:schemeClr>
+              </a:lnRef>
+              <a:fillRef idx="1">
+                <a:schemeClr val="accent1"/>
+              </a:fillRef>
+              <a:effectRef idx="0">
+                <a:schemeClr val="accent1"/>
+              </a:effectRef>
+              <a:fontRef idx="minor">
+                <a:schemeClr val="lt1"/>
+              </a:fontRef>
+            </p:style>
+            <p:txBody>
+              <a:bodyPr/>
+              <a:p>
+                <a:pPr>
+                  <a:defRPr/>
+                </a:pPr>
+                <a:endParaRPr/>
+              </a:p>
+            </p:txBody>
+          </p:sp>
+          <p:sp>
+            <p:nvSpPr>
+              <p:cNvPr id="39" name="" hidden="0"/>
+              <p:cNvSpPr/>
+              <p:nvPr isPhoto="0" userDrawn="0"/>
+            </p:nvSpPr>
+            <p:spPr bwMode="auto">
+              <a:xfrm rot="0" flipH="0" flipV="0">
+                <a:off x="396718" y="242074"/>
+                <a:ext cx="110970" cy="110970"/>
+              </a:xfrm>
+              <a:prstGeom prst="ellipse">
+                <a:avLst/>
+              </a:prstGeom>
+              <a:solidFill>
+                <a:schemeClr val="accent4"/>
+              </a:solidFill>
+              <a:ln w="12700" cap="flat" cmpd="sng" algn="ctr">
+                <a:noFill/>
+                <a:prstDash val="solid"/>
+                <a:miter/>
+              </a:ln>
+            </p:spPr>
+            <p:style>
+              <a:lnRef idx="2">
+                <a:schemeClr val="accent1">
+                  <a:shade val="50000"/>
+                </a:schemeClr>
+              </a:lnRef>
+              <a:fillRef idx="1">
+                <a:schemeClr val="accent1"/>
+              </a:fillRef>
+              <a:effectRef idx="0">
+                <a:schemeClr val="accent1"/>
+              </a:effectRef>
+              <a:fontRef idx="minor">
+                <a:schemeClr val="lt1"/>
+              </a:fontRef>
+            </p:style>
+            <p:txBody>
+              <a:bodyPr/>
+              <a:p>
+                <a:pPr>
+                  <a:defRPr/>
+                </a:pPr>
+                <a:endParaRPr/>
+              </a:p>
+            </p:txBody>
+          </p:sp>
+          <p:sp>
+            <p:nvSpPr>
+              <p:cNvPr id="40" name="" hidden="0"/>
+              <p:cNvSpPr/>
+              <p:nvPr isPhoto="0" userDrawn="0"/>
+            </p:nvSpPr>
+            <p:spPr bwMode="auto">
+              <a:xfrm rot="0" flipH="0" flipV="0">
+                <a:off x="682468" y="813574"/>
+                <a:ext cx="110970" cy="110970"/>
+              </a:xfrm>
+              <a:prstGeom prst="ellipse">
+                <a:avLst/>
+              </a:prstGeom>
+              <a:solidFill>
+                <a:schemeClr val="accent4"/>
+              </a:solidFill>
+              <a:ln w="12700" cap="flat" cmpd="sng" algn="ctr">
+                <a:noFill/>
+                <a:prstDash val="solid"/>
+                <a:miter/>
+              </a:ln>
+            </p:spPr>
+            <p:style>
+              <a:lnRef idx="2">
+                <a:schemeClr val="accent1">
+                  <a:shade val="50000"/>
+                </a:schemeClr>
+              </a:lnRef>
+              <a:fillRef idx="1">
+                <a:schemeClr val="accent1"/>
+              </a:fillRef>
+              <a:effectRef idx="0">
+                <a:schemeClr val="accent1"/>
+              </a:effectRef>
+              <a:fontRef idx="minor">
+                <a:schemeClr val="lt1"/>
+              </a:fontRef>
+            </p:style>
+            <p:txBody>
+              <a:bodyPr/>
+              <a:p>
+                <a:pPr>
+                  <a:defRPr/>
+                </a:pPr>
+                <a:endParaRPr/>
+              </a:p>
+            </p:txBody>
+          </p:sp>
+          <p:sp>
+            <p:nvSpPr>
+              <p:cNvPr id="41" name="" hidden="0"/>
+              <p:cNvSpPr/>
+              <p:nvPr isPhoto="0" userDrawn="0"/>
+            </p:nvSpPr>
+            <p:spPr bwMode="auto">
+              <a:xfrm rot="0" flipH="0" flipV="0">
+                <a:off x="968218" y="527824"/>
+                <a:ext cx="110970" cy="110970"/>
+              </a:xfrm>
+              <a:prstGeom prst="ellipse">
+                <a:avLst/>
+              </a:prstGeom>
+              <a:solidFill>
+                <a:schemeClr val="accent4"/>
+              </a:solidFill>
+              <a:ln w="12700" cap="flat" cmpd="sng" algn="ctr">
+                <a:noFill/>
+                <a:prstDash val="solid"/>
+                <a:miter/>
+              </a:ln>
+            </p:spPr>
+            <p:style>
+              <a:lnRef idx="2">
+                <a:schemeClr val="accent1">
+                  <a:shade val="50000"/>
+                </a:schemeClr>
+              </a:lnRef>
+              <a:fillRef idx="1">
+                <a:schemeClr val="accent1"/>
+              </a:fillRef>
+              <a:effectRef idx="0">
+                <a:schemeClr val="accent1"/>
+              </a:effectRef>
+              <a:fontRef idx="minor">
+                <a:schemeClr val="lt1"/>
+              </a:fontRef>
+            </p:style>
+            <p:txBody>
+              <a:bodyPr/>
+              <a:p>
+                <a:pPr>
+                  <a:defRPr/>
+                </a:pPr>
+                <a:endParaRPr/>
+              </a:p>
+            </p:txBody>
+          </p:sp>
+          <p:sp>
+            <p:nvSpPr>
+              <p:cNvPr id="42" name="" hidden="0"/>
+              <p:cNvSpPr/>
+              <p:nvPr isPhoto="0" userDrawn="0"/>
+            </p:nvSpPr>
+            <p:spPr bwMode="auto">
+              <a:xfrm rot="0" flipH="0" flipV="0">
+                <a:off x="1253967" y="813574"/>
+                <a:ext cx="110970" cy="110970"/>
+              </a:xfrm>
+              <a:prstGeom prst="ellipse">
+                <a:avLst/>
+              </a:prstGeom>
+              <a:solidFill>
+                <a:schemeClr val="accent4"/>
+              </a:solidFill>
+              <a:ln w="12700" cap="flat" cmpd="sng" algn="ctr">
+                <a:noFill/>
+                <a:prstDash val="solid"/>
+                <a:miter/>
+              </a:ln>
+            </p:spPr>
+            <p:style>
+              <a:lnRef idx="2">
+                <a:schemeClr val="accent1">
+                  <a:shade val="50000"/>
+                </a:schemeClr>
+              </a:lnRef>
+              <a:fillRef idx="1">
+                <a:schemeClr val="accent1"/>
+              </a:fillRef>
+              <a:effectRef idx="0">
+                <a:schemeClr val="accent1"/>
+              </a:effectRef>
+              <a:fontRef idx="minor">
+                <a:schemeClr val="lt1"/>
+              </a:fontRef>
+            </p:style>
+            <p:txBody>
+              <a:bodyPr/>
+              <a:p>
+                <a:pPr>
+                  <a:defRPr/>
+                </a:pPr>
+                <a:endParaRPr/>
+              </a:p>
+            </p:txBody>
+          </p:sp>
+          <p:sp>
+            <p:nvSpPr>
+              <p:cNvPr id="43" name="" hidden="0"/>
+              <p:cNvSpPr/>
+              <p:nvPr isPhoto="0" userDrawn="0"/>
+            </p:nvSpPr>
+            <p:spPr bwMode="auto">
+              <a:xfrm rot="0" flipH="0" flipV="0">
+                <a:off x="1539717" y="813574"/>
+                <a:ext cx="110970" cy="110970"/>
+              </a:xfrm>
+              <a:prstGeom prst="ellipse">
+                <a:avLst/>
+              </a:prstGeom>
+              <a:solidFill>
+                <a:schemeClr val="accent4"/>
+              </a:solidFill>
+              <a:ln w="12700" cap="flat" cmpd="sng" algn="ctr">
+                <a:noFill/>
+                <a:prstDash val="solid"/>
+                <a:miter/>
+              </a:ln>
+            </p:spPr>
+            <p:style>
+              <a:lnRef idx="2">
+                <a:schemeClr val="accent1">
+                  <a:shade val="50000"/>
+                </a:schemeClr>
+              </a:lnRef>
+              <a:fillRef idx="1">
+                <a:schemeClr val="accent1"/>
+              </a:fillRef>
+              <a:effectRef idx="0">
+                <a:schemeClr val="accent1"/>
+              </a:effectRef>
+              <a:fontRef idx="minor">
+                <a:schemeClr val="lt1"/>
+              </a:fontRef>
+            </p:style>
+            <p:txBody>
+              <a:bodyPr/>
+              <a:p>
+                <a:pPr>
+                  <a:defRPr/>
+                </a:pPr>
+                <a:endParaRPr/>
+              </a:p>
+            </p:txBody>
+          </p:sp>
+          <p:sp>
+            <p:nvSpPr>
+              <p:cNvPr id="44" name="" hidden="0"/>
+              <p:cNvSpPr/>
+              <p:nvPr isPhoto="0" userDrawn="0"/>
+            </p:nvSpPr>
+            <p:spPr bwMode="auto">
+              <a:xfrm rot="0" flipH="0" flipV="0">
+                <a:off x="1825467" y="813574"/>
+                <a:ext cx="110970" cy="110970"/>
+              </a:xfrm>
+              <a:prstGeom prst="ellipse">
+                <a:avLst/>
+              </a:prstGeom>
+              <a:solidFill>
+                <a:schemeClr val="accent4"/>
+              </a:solidFill>
+              <a:ln w="12700" cap="flat" cmpd="sng" algn="ctr">
+                <a:noFill/>
+                <a:prstDash val="solid"/>
+                <a:miter/>
+              </a:ln>
+            </p:spPr>
+            <p:style>
+              <a:lnRef idx="2">
+                <a:schemeClr val="accent1">
+                  <a:shade val="50000"/>
+                </a:schemeClr>
+              </a:lnRef>
+              <a:fillRef idx="1">
+                <a:schemeClr val="accent1"/>
+              </a:fillRef>
+              <a:effectRef idx="0">
+                <a:schemeClr val="accent1"/>
+              </a:effectRef>
+              <a:fontRef idx="minor">
+                <a:schemeClr val="lt1"/>
+              </a:fontRef>
+            </p:style>
+            <p:txBody>
+              <a:bodyPr/>
+              <a:p>
+                <a:pPr>
+                  <a:defRPr/>
+                </a:pPr>
+                <a:endParaRPr/>
+              </a:p>
+            </p:txBody>
+          </p:sp>
+          <p:cxnSp>
+            <p:nvCxnSpPr>
+              <p:cNvPr id="45" name="" hidden="0"/>
+              <p:cNvCxnSpPr>
+                <a:cxnSpLocks/>
+              </p:cNvCxnSpPr>
+              <p:nvPr isPhoto="0" userDrawn="0"/>
+            </p:nvCxnSpPr>
+            <p:spPr bwMode="auto">
+              <a:xfrm rot="0" flipH="1" flipV="0">
+                <a:off x="167231" y="304789"/>
+                <a:ext cx="291702" cy="577452"/>
+              </a:xfrm>
+              <a:prstGeom prst="line">
+                <a:avLst/>
+              </a:prstGeom>
+              <a:ln w="28575" cap="flat" cmpd="sng" algn="ctr">
+                <a:solidFill>
+                  <a:schemeClr val="accent4"/>
+                </a:solidFill>
+                <a:prstDash val="solid"/>
+                <a:miter/>
+              </a:ln>
+            </p:spPr>
+            <p:style>
+              <a:lnRef idx="1">
+                <a:schemeClr val="accent1">
+                  <a:shade val="50000"/>
+                </a:schemeClr>
+              </a:lnRef>
+              <a:fillRef idx="0">
+                <a:schemeClr val="accent1"/>
+              </a:fillRef>
+              <a:effectRef idx="0">
+                <a:schemeClr val="accent1"/>
+              </a:effectRef>
+              <a:fontRef idx="minor">
+                <a:schemeClr val="tx1"/>
+              </a:fontRef>
+            </p:style>
+          </p:cxnSp>
+          <p:cxnSp>
+            <p:nvCxnSpPr>
+              <p:cNvPr id="46" name="" hidden="0"/>
+              <p:cNvCxnSpPr>
+                <a:cxnSpLocks/>
+              </p:cNvCxnSpPr>
+              <p:nvPr isPhoto="0" userDrawn="0"/>
+            </p:nvCxnSpPr>
+            <p:spPr bwMode="auto">
+              <a:xfrm rot="0" flipH="0" flipV="0">
+                <a:off x="458933" y="304789"/>
+                <a:ext cx="279797" cy="577453"/>
+              </a:xfrm>
+              <a:prstGeom prst="line">
+                <a:avLst/>
+              </a:prstGeom>
+              <a:ln w="28575" cap="flat" cmpd="sng" algn="ctr">
+                <a:solidFill>
+                  <a:schemeClr val="accent4"/>
+                </a:solidFill>
+                <a:prstDash val="solid"/>
+                <a:miter/>
+              </a:ln>
+            </p:spPr>
+            <p:style>
+              <a:lnRef idx="1">
+                <a:schemeClr val="accent1">
+                  <a:shade val="50000"/>
+                </a:schemeClr>
+              </a:lnRef>
+              <a:fillRef idx="0">
+                <a:schemeClr val="accent1"/>
+              </a:fillRef>
+              <a:effectRef idx="0">
+                <a:schemeClr val="accent1"/>
+              </a:effectRef>
+              <a:fontRef idx="minor">
+                <a:schemeClr val="tx1"/>
+              </a:fontRef>
+            </p:style>
+          </p:cxnSp>
+          <p:cxnSp>
+            <p:nvCxnSpPr>
+              <p:cNvPr id="47" name="" hidden="0"/>
+              <p:cNvCxnSpPr>
+                <a:cxnSpLocks/>
+              </p:cNvCxnSpPr>
+              <p:nvPr isPhoto="0" userDrawn="0"/>
+            </p:nvCxnSpPr>
+            <p:spPr bwMode="auto">
+              <a:xfrm rot="0" flipH="1" flipV="0">
+                <a:off x="738730" y="590540"/>
+                <a:ext cx="279797" cy="291702"/>
+              </a:xfrm>
+              <a:prstGeom prst="line">
+                <a:avLst/>
+              </a:prstGeom>
+              <a:ln w="28575" cap="flat" cmpd="sng" algn="ctr">
+                <a:solidFill>
+                  <a:schemeClr val="accent4"/>
+                </a:solidFill>
+                <a:prstDash val="solid"/>
+                <a:miter/>
+              </a:ln>
+            </p:spPr>
+            <p:style>
+              <a:lnRef idx="1">
+                <a:schemeClr val="accent1">
+                  <a:shade val="50000"/>
+                </a:schemeClr>
+              </a:lnRef>
+              <a:fillRef idx="0">
+                <a:schemeClr val="accent1"/>
+              </a:fillRef>
+              <a:effectRef idx="0">
+                <a:schemeClr val="accent1"/>
+              </a:effectRef>
+              <a:fontRef idx="minor">
+                <a:schemeClr val="tx1"/>
+              </a:fontRef>
+            </p:style>
+          </p:cxnSp>
+          <p:cxnSp>
+            <p:nvCxnSpPr>
+              <p:cNvPr id="48" name="" hidden="0"/>
+              <p:cNvCxnSpPr>
+                <a:cxnSpLocks/>
+              </p:cNvCxnSpPr>
+              <p:nvPr isPhoto="0" userDrawn="0"/>
+            </p:nvCxnSpPr>
+            <p:spPr bwMode="auto">
+              <a:xfrm rot="0" flipH="0" flipV="0">
+                <a:off x="1018527" y="590539"/>
+                <a:ext cx="291702" cy="291703"/>
+              </a:xfrm>
+              <a:prstGeom prst="line">
+                <a:avLst/>
+              </a:prstGeom>
+              <a:ln w="28575" cap="flat" cmpd="sng" algn="ctr">
+                <a:solidFill>
+                  <a:schemeClr val="accent4"/>
+                </a:solidFill>
+                <a:prstDash val="solid"/>
+                <a:miter/>
+              </a:ln>
+            </p:spPr>
+            <p:style>
+              <a:lnRef idx="1">
+                <a:schemeClr val="accent1">
+                  <a:shade val="50000"/>
+                </a:schemeClr>
+              </a:lnRef>
+              <a:fillRef idx="0">
+                <a:schemeClr val="accent1"/>
+              </a:fillRef>
+              <a:effectRef idx="0">
+                <a:schemeClr val="accent1"/>
+              </a:effectRef>
+              <a:fontRef idx="minor">
+                <a:schemeClr val="tx1"/>
+              </a:fontRef>
+            </p:style>
+          </p:cxnSp>
+          <p:cxnSp>
+            <p:nvCxnSpPr>
+              <p:cNvPr id="49" name="" hidden="0"/>
+              <p:cNvCxnSpPr>
+                <a:cxnSpLocks/>
+              </p:cNvCxnSpPr>
+              <p:nvPr isPhoto="0" userDrawn="0"/>
+            </p:nvCxnSpPr>
+            <p:spPr bwMode="auto">
+              <a:xfrm rot="0" flipH="1" flipV="0">
+                <a:off x="1310230" y="876290"/>
+                <a:ext cx="279797" cy="5952"/>
+              </a:xfrm>
+              <a:prstGeom prst="line">
+                <a:avLst/>
+              </a:prstGeom>
+              <a:ln w="28575" cap="flat" cmpd="sng" algn="ctr">
+                <a:solidFill>
+                  <a:schemeClr val="accent4"/>
+                </a:solidFill>
+                <a:prstDash val="solid"/>
+                <a:miter/>
+              </a:ln>
+            </p:spPr>
+            <p:style>
+              <a:lnRef idx="1">
+                <a:schemeClr val="accent1">
+                  <a:shade val="50000"/>
+                </a:schemeClr>
+              </a:lnRef>
+              <a:fillRef idx="0">
+                <a:schemeClr val="accent1"/>
+              </a:fillRef>
+              <a:effectRef idx="0">
+                <a:schemeClr val="accent1"/>
+              </a:effectRef>
+              <a:fontRef idx="minor">
+                <a:schemeClr val="tx1"/>
+              </a:fontRef>
+            </p:style>
+          </p:cxnSp>
+          <p:cxnSp>
+            <p:nvCxnSpPr>
+              <p:cNvPr id="50" name="" hidden="0"/>
+              <p:cNvCxnSpPr>
+                <a:cxnSpLocks/>
+              </p:cNvCxnSpPr>
+              <p:nvPr isPhoto="0" userDrawn="0"/>
+            </p:nvCxnSpPr>
+            <p:spPr bwMode="auto">
+              <a:xfrm rot="0" flipH="0" flipV="1">
+                <a:off x="1590027" y="873854"/>
+                <a:ext cx="298146" cy="0"/>
+              </a:xfrm>
+              <a:prstGeom prst="line">
+                <a:avLst/>
+              </a:prstGeom>
+              <a:ln w="28575" cap="flat" cmpd="sng" algn="ctr">
+                <a:solidFill>
+                  <a:schemeClr val="accent4"/>
+                </a:solidFill>
+                <a:prstDash val="solid"/>
+                <a:miter/>
+              </a:ln>
+            </p:spPr>
+            <p:style>
+              <a:lnRef idx="1">
+                <a:schemeClr val="accent1">
+                  <a:shade val="50000"/>
+                </a:schemeClr>
+              </a:lnRef>
+              <a:fillRef idx="0">
+                <a:schemeClr val="accent1"/>
+              </a:fillRef>
+              <a:effectRef idx="0">
+                <a:schemeClr val="accent1"/>
+              </a:effectRef>
+              <a:fontRef idx="minor">
+                <a:schemeClr val="tx1"/>
+              </a:fontRef>
+            </p:style>
+          </p:cxnSp>
+        </p:grpSp>
+        <p:cxnSp>
+          <p:nvCxnSpPr>
+            <p:cNvPr id="51" name="" hidden="0"/>
             <p:cNvCxnSpPr>
               <a:cxnSpLocks/>
             </p:cNvCxnSpPr>
@@ -5871,7 +6979,7 @@
           </p:nvCxnSpPr>
           <p:spPr bwMode="auto">
             <a:xfrm rot="0" flipH="0" flipV="0">
-              <a:off x="0" y="1063261"/>
+              <a:off x="5197" y="2170608"/>
               <a:ext cx="2274901" cy="0"/>
             </a:xfrm>
             <a:prstGeom prst="line">
@@ -5908,7 +7016,7 @@
         </p:cxnSp>
         <p:cxnSp>
           <p:nvCxnSpPr>
-            <p:cNvPr id="26" name="" hidden="0"/>
+            <p:cNvPr id="52" name="" hidden="0"/>
             <p:cNvCxnSpPr>
               <a:cxnSpLocks/>
             </p:cNvCxnSpPr>
@@ -5916,7 +7024,7 @@
           </p:nvCxnSpPr>
           <p:spPr bwMode="auto">
             <a:xfrm rot="16199969" flipH="0" flipV="0">
-              <a:off x="-531629" y="531630"/>
+              <a:off x="-526430" y="1638977"/>
               <a:ext cx="1063260" cy="0"/>
             </a:xfrm>
             <a:prstGeom prst="line">
@@ -5953,13 +7061,1863 @@
         </p:cxnSp>
         <p:sp>
           <p:nvSpPr>
-            <p:cNvPr id="27" name="" hidden="0"/>
+            <p:cNvPr id="53" name="" hidden="0"/>
             <p:cNvSpPr/>
             <p:nvPr isPhoto="0" userDrawn="0"/>
           </p:nvSpPr>
           <p:spPr bwMode="auto">
             <a:xfrm rot="0" flipH="0" flipV="0">
-              <a:off x="110970" y="813576"/>
+              <a:off x="390011" y="1920922"/>
+              <a:ext cx="110970" cy="110970"/>
+            </a:xfrm>
+            <a:prstGeom prst="ellipse">
+              <a:avLst/>
+            </a:prstGeom>
+            <a:solidFill>
+              <a:schemeClr val="accent1"/>
+            </a:solidFill>
+            <a:ln w="12700" cap="flat" cmpd="sng" algn="ctr">
+              <a:noFill/>
+              <a:prstDash val="solid"/>
+              <a:miter/>
+            </a:ln>
+          </p:spPr>
+          <p:style>
+            <a:lnRef idx="2">
+              <a:schemeClr val="accent1">
+                <a:shade val="50000"/>
+              </a:schemeClr>
+            </a:lnRef>
+            <a:fillRef idx="1">
+              <a:schemeClr val="accent1"/>
+            </a:fillRef>
+            <a:effectRef idx="0">
+              <a:schemeClr val="accent1"/>
+            </a:effectRef>
+            <a:fontRef idx="minor">
+              <a:schemeClr val="lt1"/>
+            </a:fontRef>
+          </p:style>
+          <p:txBody>
+            <a:bodyPr/>
+            <a:p>
+              <a:pPr>
+                <a:defRPr/>
+              </a:pPr>
+              <a:endParaRPr/>
+            </a:p>
+          </p:txBody>
+        </p:sp>
+        <p:sp>
+          <p:nvSpPr>
+            <p:cNvPr id="54" name="" hidden="0"/>
+            <p:cNvSpPr/>
+            <p:nvPr isPhoto="0" userDrawn="0"/>
+          </p:nvSpPr>
+          <p:spPr bwMode="auto">
+            <a:xfrm rot="0" flipH="0" flipV="0">
+              <a:off x="675760" y="1349421"/>
+              <a:ext cx="110970" cy="110970"/>
+            </a:xfrm>
+            <a:prstGeom prst="ellipse">
+              <a:avLst/>
+            </a:prstGeom>
+            <a:solidFill>
+              <a:schemeClr val="accent1"/>
+            </a:solidFill>
+            <a:ln w="12700" cap="flat" cmpd="sng" algn="ctr">
+              <a:noFill/>
+              <a:prstDash val="solid"/>
+              <a:miter/>
+            </a:ln>
+          </p:spPr>
+          <p:style>
+            <a:lnRef idx="2">
+              <a:schemeClr val="accent1">
+                <a:shade val="50000"/>
+              </a:schemeClr>
+            </a:lnRef>
+            <a:fillRef idx="1">
+              <a:schemeClr val="accent1"/>
+            </a:fillRef>
+            <a:effectRef idx="0">
+              <a:schemeClr val="accent1"/>
+            </a:effectRef>
+            <a:fontRef idx="minor">
+              <a:schemeClr val="lt1"/>
+            </a:fontRef>
+          </p:style>
+          <p:txBody>
+            <a:bodyPr/>
+            <a:p>
+              <a:pPr>
+                <a:defRPr/>
+              </a:pPr>
+              <a:endParaRPr/>
+            </a:p>
+          </p:txBody>
+        </p:sp>
+        <p:sp>
+          <p:nvSpPr>
+            <p:cNvPr id="55" name="" hidden="0"/>
+            <p:cNvSpPr/>
+            <p:nvPr isPhoto="0" userDrawn="0"/>
+          </p:nvSpPr>
+          <p:spPr bwMode="auto">
+            <a:xfrm rot="0" flipH="0" flipV="0">
+              <a:off x="961510" y="1920921"/>
+              <a:ext cx="110970" cy="110970"/>
+            </a:xfrm>
+            <a:prstGeom prst="ellipse">
+              <a:avLst/>
+            </a:prstGeom>
+            <a:solidFill>
+              <a:schemeClr val="accent1"/>
+            </a:solidFill>
+            <a:ln w="12700" cap="flat" cmpd="sng" algn="ctr">
+              <a:noFill/>
+              <a:prstDash val="solid"/>
+              <a:miter/>
+            </a:ln>
+          </p:spPr>
+          <p:style>
+            <a:lnRef idx="2">
+              <a:schemeClr val="accent1">
+                <a:shade val="50000"/>
+              </a:schemeClr>
+            </a:lnRef>
+            <a:fillRef idx="1">
+              <a:schemeClr val="accent1"/>
+            </a:fillRef>
+            <a:effectRef idx="0">
+              <a:schemeClr val="accent1"/>
+            </a:effectRef>
+            <a:fontRef idx="minor">
+              <a:schemeClr val="lt1"/>
+            </a:fontRef>
+          </p:style>
+          <p:txBody>
+            <a:bodyPr/>
+            <a:p>
+              <a:pPr>
+                <a:defRPr/>
+              </a:pPr>
+              <a:endParaRPr/>
+            </a:p>
+          </p:txBody>
+        </p:sp>
+        <p:sp>
+          <p:nvSpPr>
+            <p:cNvPr id="56" name="" hidden="0"/>
+            <p:cNvSpPr/>
+            <p:nvPr isPhoto="0" userDrawn="0"/>
+          </p:nvSpPr>
+          <p:spPr bwMode="auto">
+            <a:xfrm rot="0" flipH="0" flipV="0">
+              <a:off x="1247260" y="1635171"/>
+              <a:ext cx="110970" cy="110970"/>
+            </a:xfrm>
+            <a:prstGeom prst="ellipse">
+              <a:avLst/>
+            </a:prstGeom>
+            <a:solidFill>
+              <a:schemeClr val="accent1"/>
+            </a:solidFill>
+            <a:ln w="12700" cap="flat" cmpd="sng" algn="ctr">
+              <a:noFill/>
+              <a:prstDash val="solid"/>
+              <a:miter/>
+            </a:ln>
+          </p:spPr>
+          <p:style>
+            <a:lnRef idx="2">
+              <a:schemeClr val="accent1">
+                <a:shade val="50000"/>
+              </a:schemeClr>
+            </a:lnRef>
+            <a:fillRef idx="1">
+              <a:schemeClr val="accent1"/>
+            </a:fillRef>
+            <a:effectRef idx="0">
+              <a:schemeClr val="accent1"/>
+            </a:effectRef>
+            <a:fontRef idx="minor">
+              <a:schemeClr val="lt1"/>
+            </a:fontRef>
+          </p:style>
+          <p:txBody>
+            <a:bodyPr/>
+            <a:p>
+              <a:pPr>
+                <a:defRPr/>
+              </a:pPr>
+              <a:endParaRPr/>
+            </a:p>
+          </p:txBody>
+        </p:sp>
+        <p:sp>
+          <p:nvSpPr>
+            <p:cNvPr id="57" name="" hidden="0"/>
+            <p:cNvSpPr/>
+            <p:nvPr isPhoto="0" userDrawn="0"/>
+          </p:nvSpPr>
+          <p:spPr bwMode="auto">
+            <a:xfrm rot="0" flipH="0" flipV="0">
+              <a:off x="1533010" y="1920921"/>
+              <a:ext cx="110970" cy="110970"/>
+            </a:xfrm>
+            <a:prstGeom prst="ellipse">
+              <a:avLst/>
+            </a:prstGeom>
+            <a:solidFill>
+              <a:schemeClr val="accent1"/>
+            </a:solidFill>
+            <a:ln w="12700" cap="flat" cmpd="sng" algn="ctr">
+              <a:noFill/>
+              <a:prstDash val="solid"/>
+              <a:miter/>
+            </a:ln>
+          </p:spPr>
+          <p:style>
+            <a:lnRef idx="2">
+              <a:schemeClr val="accent1">
+                <a:shade val="50000"/>
+              </a:schemeClr>
+            </a:lnRef>
+            <a:fillRef idx="1">
+              <a:schemeClr val="accent1"/>
+            </a:fillRef>
+            <a:effectRef idx="0">
+              <a:schemeClr val="accent1"/>
+            </a:effectRef>
+            <a:fontRef idx="minor">
+              <a:schemeClr val="lt1"/>
+            </a:fontRef>
+          </p:style>
+          <p:txBody>
+            <a:bodyPr/>
+            <a:p>
+              <a:pPr>
+                <a:defRPr/>
+              </a:pPr>
+              <a:endParaRPr/>
+            </a:p>
+          </p:txBody>
+        </p:sp>
+        <p:sp>
+          <p:nvSpPr>
+            <p:cNvPr id="58" name="" hidden="0"/>
+            <p:cNvSpPr/>
+            <p:nvPr isPhoto="0" userDrawn="0"/>
+          </p:nvSpPr>
+          <p:spPr bwMode="auto">
+            <a:xfrm rot="0" flipH="0" flipV="0">
+              <a:off x="1818760" y="1920921"/>
+              <a:ext cx="110970" cy="110970"/>
+            </a:xfrm>
+            <a:prstGeom prst="ellipse">
+              <a:avLst/>
+            </a:prstGeom>
+            <a:solidFill>
+              <a:schemeClr val="accent1"/>
+            </a:solidFill>
+            <a:ln w="12700" cap="flat" cmpd="sng" algn="ctr">
+              <a:noFill/>
+              <a:prstDash val="solid"/>
+              <a:miter/>
+            </a:ln>
+          </p:spPr>
+          <p:style>
+            <a:lnRef idx="2">
+              <a:schemeClr val="accent1">
+                <a:shade val="50000"/>
+              </a:schemeClr>
+            </a:lnRef>
+            <a:fillRef idx="1">
+              <a:schemeClr val="accent1"/>
+            </a:fillRef>
+            <a:effectRef idx="0">
+              <a:schemeClr val="accent1"/>
+            </a:effectRef>
+            <a:fontRef idx="minor">
+              <a:schemeClr val="lt1"/>
+            </a:fontRef>
+          </p:style>
+          <p:txBody>
+            <a:bodyPr/>
+            <a:p>
+              <a:pPr>
+                <a:defRPr/>
+              </a:pPr>
+              <a:endParaRPr/>
+            </a:p>
+          </p:txBody>
+        </p:sp>
+        <p:sp>
+          <p:nvSpPr>
+            <p:cNvPr id="59" name="" hidden="0"/>
+            <p:cNvSpPr/>
+            <p:nvPr isPhoto="0" userDrawn="0"/>
+          </p:nvSpPr>
+          <p:spPr bwMode="auto">
+            <a:xfrm rot="0" flipH="0" flipV="0">
+              <a:off x="108947" y="1934104"/>
+              <a:ext cx="110970" cy="110970"/>
+            </a:xfrm>
+            <a:prstGeom prst="ellipse">
+              <a:avLst/>
+            </a:prstGeom>
+            <a:solidFill>
+              <a:schemeClr val="accent1"/>
+            </a:solidFill>
+            <a:ln w="12700" cap="flat" cmpd="sng" algn="ctr">
+              <a:noFill/>
+              <a:prstDash val="solid"/>
+              <a:miter/>
+            </a:ln>
+          </p:spPr>
+          <p:style>
+            <a:lnRef idx="2">
+              <a:schemeClr val="accent1">
+                <a:shade val="50000"/>
+              </a:schemeClr>
+            </a:lnRef>
+            <a:fillRef idx="1">
+              <a:schemeClr val="accent1"/>
+            </a:fillRef>
+            <a:effectRef idx="0">
+              <a:schemeClr val="accent1"/>
+            </a:effectRef>
+            <a:fontRef idx="minor">
+              <a:schemeClr val="lt1"/>
+            </a:fontRef>
+          </p:style>
+          <p:txBody>
+            <a:bodyPr/>
+            <a:p>
+              <a:pPr>
+                <a:defRPr/>
+              </a:pPr>
+              <a:endParaRPr/>
+            </a:p>
+          </p:txBody>
+        </p:sp>
+        <p:cxnSp>
+          <p:nvCxnSpPr>
+            <p:cNvPr id="60" name="" hidden="0"/>
+            <p:cNvCxnSpPr>
+              <a:cxnSpLocks/>
+            </p:cNvCxnSpPr>
+            <p:nvPr isPhoto="0" userDrawn="0"/>
+          </p:nvCxnSpPr>
+          <p:spPr bwMode="auto">
+            <a:xfrm rot="0" flipH="1" flipV="0">
+              <a:off x="446272" y="1412137"/>
+              <a:ext cx="291702" cy="577452"/>
+            </a:xfrm>
+            <a:prstGeom prst="line">
+              <a:avLst/>
+            </a:prstGeom>
+            <a:ln w="28575" cap="flat" cmpd="sng" algn="ctr">
+              <a:solidFill>
+                <a:schemeClr val="accent1"/>
+              </a:solidFill>
+              <a:prstDash val="solid"/>
+              <a:miter/>
+            </a:ln>
+          </p:spPr>
+          <p:style>
+            <a:lnRef idx="1">
+              <a:schemeClr val="accent1">
+                <a:shade val="50000"/>
+              </a:schemeClr>
+            </a:lnRef>
+            <a:fillRef idx="0">
+              <a:schemeClr val="accent1"/>
+            </a:fillRef>
+            <a:effectRef idx="0">
+              <a:schemeClr val="accent1"/>
+            </a:effectRef>
+            <a:fontRef idx="minor">
+              <a:schemeClr val="tx1"/>
+            </a:fontRef>
+          </p:style>
+        </p:cxnSp>
+        <p:cxnSp>
+          <p:nvCxnSpPr>
+            <p:cNvPr id="24" name="" hidden="0"/>
+            <p:cNvCxnSpPr>
+              <a:cxnSpLocks/>
+            </p:cNvCxnSpPr>
+            <p:nvPr isPhoto="0" userDrawn="0"/>
+          </p:nvCxnSpPr>
+          <p:spPr bwMode="auto">
+            <a:xfrm rot="0" flipH="0" flipV="0">
+              <a:off x="737975" y="1412136"/>
+              <a:ext cx="279796" cy="577452"/>
+            </a:xfrm>
+            <a:prstGeom prst="line">
+              <a:avLst/>
+            </a:prstGeom>
+            <a:ln w="28575" cap="flat" cmpd="sng" algn="ctr">
+              <a:solidFill>
+                <a:schemeClr val="accent1"/>
+              </a:solidFill>
+              <a:prstDash val="solid"/>
+              <a:miter/>
+            </a:ln>
+          </p:spPr>
+          <p:style>
+            <a:lnRef idx="1">
+              <a:schemeClr val="accent1">
+                <a:shade val="50000"/>
+              </a:schemeClr>
+            </a:lnRef>
+            <a:fillRef idx="0">
+              <a:schemeClr val="accent1"/>
+            </a:fillRef>
+            <a:effectRef idx="0">
+              <a:schemeClr val="accent1"/>
+            </a:effectRef>
+            <a:fontRef idx="minor">
+              <a:schemeClr val="tx1"/>
+            </a:fontRef>
+          </p:style>
+        </p:cxnSp>
+        <p:cxnSp>
+          <p:nvCxnSpPr>
+            <p:cNvPr id="27" name="" hidden="0"/>
+            <p:cNvCxnSpPr>
+              <a:cxnSpLocks/>
+            </p:cNvCxnSpPr>
+            <p:nvPr isPhoto="0" userDrawn="0"/>
+          </p:nvCxnSpPr>
+          <p:spPr bwMode="auto">
+            <a:xfrm rot="0" flipH="1" flipV="0">
+              <a:off x="1017772" y="1697887"/>
+              <a:ext cx="279796" cy="291701"/>
+            </a:xfrm>
+            <a:prstGeom prst="line">
+              <a:avLst/>
+            </a:prstGeom>
+            <a:ln w="28575" cap="flat" cmpd="sng" algn="ctr">
+              <a:solidFill>
+                <a:schemeClr val="accent1"/>
+              </a:solidFill>
+              <a:prstDash val="solid"/>
+              <a:miter/>
+            </a:ln>
+          </p:spPr>
+          <p:style>
+            <a:lnRef idx="1">
+              <a:schemeClr val="accent1">
+                <a:shade val="50000"/>
+              </a:schemeClr>
+            </a:lnRef>
+            <a:fillRef idx="0">
+              <a:schemeClr val="accent1"/>
+            </a:fillRef>
+            <a:effectRef idx="0">
+              <a:schemeClr val="accent1"/>
+            </a:effectRef>
+            <a:fontRef idx="minor">
+              <a:schemeClr val="tx1"/>
+            </a:fontRef>
+          </p:style>
+        </p:cxnSp>
+        <p:cxnSp>
+          <p:nvCxnSpPr>
+            <p:cNvPr id="29" name="" hidden="0"/>
+            <p:cNvCxnSpPr>
+              <a:cxnSpLocks/>
+            </p:cNvCxnSpPr>
+            <p:nvPr isPhoto="0" userDrawn="0"/>
+          </p:nvCxnSpPr>
+          <p:spPr bwMode="auto">
+            <a:xfrm rot="0" flipH="0" flipV="0">
+              <a:off x="1297569" y="1697886"/>
+              <a:ext cx="291702" cy="291702"/>
+            </a:xfrm>
+            <a:prstGeom prst="line">
+              <a:avLst/>
+            </a:prstGeom>
+            <a:ln w="28575" cap="flat" cmpd="sng" algn="ctr">
+              <a:solidFill>
+                <a:schemeClr val="accent1"/>
+              </a:solidFill>
+              <a:prstDash val="solid"/>
+              <a:miter/>
+            </a:ln>
+          </p:spPr>
+          <p:style>
+            <a:lnRef idx="1">
+              <a:schemeClr val="accent1">
+                <a:shade val="50000"/>
+              </a:schemeClr>
+            </a:lnRef>
+            <a:fillRef idx="0">
+              <a:schemeClr val="accent1"/>
+            </a:fillRef>
+            <a:effectRef idx="0">
+              <a:schemeClr val="accent1"/>
+            </a:effectRef>
+            <a:fontRef idx="minor">
+              <a:schemeClr val="tx1"/>
+            </a:fontRef>
+          </p:style>
+        </p:cxnSp>
+        <p:cxnSp>
+          <p:nvCxnSpPr>
+            <p:cNvPr id="32" name="" hidden="0"/>
+            <p:cNvCxnSpPr>
+              <a:cxnSpLocks/>
+            </p:cNvCxnSpPr>
+            <p:nvPr isPhoto="0" userDrawn="0"/>
+          </p:nvCxnSpPr>
+          <p:spPr bwMode="auto">
+            <a:xfrm rot="0" flipH="1" flipV="0">
+              <a:off x="1589271" y="1983637"/>
+              <a:ext cx="279796" cy="5951"/>
+            </a:xfrm>
+            <a:prstGeom prst="line">
+              <a:avLst/>
+            </a:prstGeom>
+            <a:ln w="28575" cap="flat" cmpd="sng" algn="ctr">
+              <a:solidFill>
+                <a:schemeClr val="accent1"/>
+              </a:solidFill>
+              <a:prstDash val="solid"/>
+              <a:miter/>
+            </a:ln>
+          </p:spPr>
+          <p:style>
+            <a:lnRef idx="1">
+              <a:schemeClr val="accent1">
+                <a:shade val="50000"/>
+              </a:schemeClr>
+            </a:lnRef>
+            <a:fillRef idx="0">
+              <a:schemeClr val="accent1"/>
+            </a:fillRef>
+            <a:effectRef idx="0">
+              <a:schemeClr val="accent1"/>
+            </a:effectRef>
+            <a:fontRef idx="minor">
+              <a:schemeClr val="tx1"/>
+            </a:fontRef>
+          </p:style>
+        </p:cxnSp>
+        <p:cxnSp>
+          <p:nvCxnSpPr>
+            <p:cNvPr id="21" name="" hidden="0"/>
+            <p:cNvCxnSpPr>
+              <a:cxnSpLocks/>
+              <a:stCxn id="60" idx="1"/>
+            </p:cNvCxnSpPr>
+            <p:nvPr isPhoto="0" userDrawn="0"/>
+          </p:nvCxnSpPr>
+          <p:spPr bwMode="auto">
+            <a:xfrm rot="16199969" flipH="1" flipV="1">
+              <a:off x="308963" y="1854678"/>
+              <a:ext cx="0" cy="274618"/>
+            </a:xfrm>
+            <a:prstGeom prst="line">
+              <a:avLst/>
+            </a:prstGeom>
+            <a:ln w="28575" cap="flat" cmpd="sng" algn="ctr">
+              <a:solidFill>
+                <a:schemeClr val="accent1"/>
+              </a:solidFill>
+              <a:prstDash val="solid"/>
+              <a:miter/>
+            </a:ln>
+          </p:spPr>
+          <p:style>
+            <a:lnRef idx="1">
+              <a:schemeClr val="accent1">
+                <a:shade val="50000"/>
+              </a:schemeClr>
+            </a:lnRef>
+            <a:fillRef idx="0">
+              <a:schemeClr val="accent1"/>
+            </a:fillRef>
+            <a:effectRef idx="0">
+              <a:schemeClr val="accent1"/>
+            </a:effectRef>
+            <a:fontRef idx="minor">
+              <a:schemeClr val="tx1"/>
+            </a:fontRef>
+          </p:style>
+        </p:cxnSp>
+        <p:sp>
+          <p:nvSpPr>
+            <p:cNvPr id="61" name="" hidden="0"/>
+            <p:cNvSpPr/>
+            <p:nvPr isPhoto="0" userDrawn="0"/>
+          </p:nvSpPr>
+          <p:spPr bwMode="auto">
+            <a:xfrm rot="0" flipH="0" flipV="0">
+              <a:off x="1156770" y="1708898"/>
+              <a:ext cx="256750" cy="320075"/>
+            </a:xfrm>
+            <a:prstGeom prst="rect">
+              <a:avLst/>
+            </a:prstGeom>
+            <a:noFill/>
+          </p:spPr>
+          <p:txBody>
+            <a:bodyPr vertOverflow="overflow" horzOverflow="clip" vert="horz" wrap="square" lIns="91440" tIns="45720" rIns="91440" bIns="45720" numCol="1" spcCol="0" rtlCol="0" fromWordArt="0" anchor="t" anchorCtr="0" forceAA="0" upright="0" compatLnSpc="0">
+              <a:spAutoFit/>
+            </a:bodyPr>
+            <a:p>
+              <a:pPr algn="l">
+                <a:defRPr/>
+              </a:pPr>
+              <a:r>
+                <a:rPr sz="1500">
+                  <a:solidFill>
+                    <a:schemeClr val="accent1"/>
+                  </a:solidFill>
+                  <a:latin typeface="Poppins"/>
+                  <a:ea typeface="Poppins"/>
+                  <a:cs typeface="Poppins"/>
+                </a:rPr>
+                <a:t>2</a:t>
+              </a:r>
+              <a:endParaRPr>
+                <a:solidFill>
+                  <a:schemeClr val="accent1"/>
+                </a:solidFill>
+              </a:endParaRPr>
+            </a:p>
+          </p:txBody>
+        </p:sp>
+        <p:sp>
+          <p:nvSpPr>
+            <p:cNvPr id="62" name="" hidden="0"/>
+            <p:cNvSpPr/>
+            <p:nvPr isPhoto="0" userDrawn="0"/>
+          </p:nvSpPr>
+          <p:spPr bwMode="auto">
+            <a:xfrm rot="0" flipH="0" flipV="0">
+              <a:off x="596475" y="1512794"/>
+              <a:ext cx="256786" cy="320075"/>
+            </a:xfrm>
+            <a:prstGeom prst="rect">
+              <a:avLst/>
+            </a:prstGeom>
+            <a:noFill/>
+          </p:spPr>
+          <p:txBody>
+            <a:bodyPr vertOverflow="overflow" horzOverflow="clip" vert="horz" wrap="square" lIns="91440" tIns="45720" rIns="91440" bIns="45720" numCol="1" spcCol="0" rtlCol="0" fromWordArt="0" anchor="t" anchorCtr="0" forceAA="0" upright="0" compatLnSpc="0">
+              <a:spAutoFit/>
+            </a:bodyPr>
+            <a:p>
+              <a:pPr algn="l">
+                <a:defRPr/>
+              </a:pPr>
+              <a:r>
+                <a:rPr sz="1500">
+                  <a:solidFill>
+                    <a:schemeClr val="accent1"/>
+                  </a:solidFill>
+                  <a:latin typeface="Poppins"/>
+                  <a:ea typeface="Poppins"/>
+                  <a:cs typeface="Poppins"/>
+                </a:rPr>
+                <a:t>3</a:t>
+              </a:r>
+              <a:endParaRPr>
+                <a:solidFill>
+                  <a:schemeClr val="accent1"/>
+                </a:solidFill>
+              </a:endParaRPr>
+            </a:p>
+          </p:txBody>
+        </p:sp>
+        <p:sp>
+          <p:nvSpPr>
+            <p:cNvPr id="20" name="" hidden="0"/>
+            <p:cNvSpPr/>
+            <p:nvPr isPhoto="0" userDrawn="0"/>
+          </p:nvSpPr>
+          <p:spPr bwMode="auto">
+            <a:xfrm rot="0" flipH="0" flipV="0">
+              <a:off x="36182" y="560295"/>
+              <a:ext cx="256534" cy="320075"/>
+            </a:xfrm>
+            <a:prstGeom prst="rect">
+              <a:avLst/>
+            </a:prstGeom>
+            <a:noFill/>
+          </p:spPr>
+          <p:txBody>
+            <a:bodyPr vertOverflow="overflow" horzOverflow="clip" vert="horz" wrap="square" lIns="91440" tIns="45720" rIns="91440" bIns="45720" numCol="1" spcCol="0" rtlCol="0" fromWordArt="0" anchor="t" anchorCtr="0" forceAA="0" upright="0" compatLnSpc="0">
+              <a:spAutoFit/>
+            </a:bodyPr>
+            <a:p>
+              <a:pPr algn="l">
+                <a:defRPr/>
+              </a:pPr>
+              <a:r>
+                <a:rPr sz="1500">
+                  <a:solidFill>
+                    <a:schemeClr val="accent4">
+                      <a:lumMod val="60000"/>
+                      <a:lumOff val="40000"/>
+                    </a:schemeClr>
+                  </a:solidFill>
+                  <a:latin typeface="Poppins"/>
+                  <a:ea typeface="Poppins"/>
+                  <a:cs typeface="Poppins"/>
+                </a:rPr>
+                <a:t>1</a:t>
+              </a:r>
+              <a:endParaRPr/>
+            </a:p>
+          </p:txBody>
+        </p:sp>
+        <p:sp>
+          <p:nvSpPr>
+            <p:cNvPr id="26" name="" hidden="0"/>
+            <p:cNvSpPr/>
+            <p:nvPr isPhoto="0" userDrawn="0"/>
+          </p:nvSpPr>
+          <p:spPr bwMode="auto">
+            <a:xfrm rot="0" flipH="0" flipV="0">
+              <a:off x="624491" y="560295"/>
+              <a:ext cx="256570" cy="320075"/>
+            </a:xfrm>
+            <a:prstGeom prst="rect">
+              <a:avLst/>
+            </a:prstGeom>
+            <a:noFill/>
+          </p:spPr>
+          <p:txBody>
+            <a:bodyPr vertOverflow="overflow" horzOverflow="clip" vert="horz" wrap="square" lIns="91440" tIns="45720" rIns="91440" bIns="45720" numCol="1" spcCol="0" rtlCol="0" fromWordArt="0" anchor="t" anchorCtr="0" forceAA="0" upright="0" compatLnSpc="0">
+              <a:spAutoFit/>
+            </a:bodyPr>
+            <a:p>
+              <a:pPr algn="l">
+                <a:defRPr/>
+              </a:pPr>
+              <a:r>
+                <a:rPr sz="1500">
+                  <a:solidFill>
+                    <a:schemeClr val="accent4">
+                      <a:lumMod val="60000"/>
+                      <a:lumOff val="40000"/>
+                    </a:schemeClr>
+                  </a:solidFill>
+                  <a:latin typeface="Poppins"/>
+                  <a:ea typeface="Poppins"/>
+                  <a:cs typeface="Poppins"/>
+                </a:rPr>
+                <a:t>1</a:t>
+              </a:r>
+              <a:endParaRPr/>
+            </a:p>
+          </p:txBody>
+        </p:sp>
+        <p:sp>
+          <p:nvSpPr>
+            <p:cNvPr id="31" name="" hidden="0"/>
+            <p:cNvSpPr/>
+            <p:nvPr isPhoto="0" userDrawn="0"/>
+          </p:nvSpPr>
+          <p:spPr bwMode="auto">
+            <a:xfrm rot="0" flipH="0" flipV="0">
+              <a:off x="1184784" y="560295"/>
+              <a:ext cx="256606" cy="320075"/>
+            </a:xfrm>
+            <a:prstGeom prst="rect">
+              <a:avLst/>
+            </a:prstGeom>
+            <a:noFill/>
+          </p:spPr>
+          <p:txBody>
+            <a:bodyPr vertOverflow="overflow" horzOverflow="clip" vert="horz" wrap="square" lIns="91440" tIns="45720" rIns="91440" bIns="45720" numCol="1" spcCol="0" rtlCol="0" fromWordArt="0" anchor="t" anchorCtr="0" forceAA="0" upright="0" compatLnSpc="0">
+              <a:spAutoFit/>
+            </a:bodyPr>
+            <a:p>
+              <a:pPr algn="l">
+                <a:defRPr/>
+              </a:pPr>
+              <a:r>
+                <a:rPr sz="1500">
+                  <a:solidFill>
+                    <a:schemeClr val="accent4">
+                      <a:lumMod val="60000"/>
+                      <a:lumOff val="40000"/>
+                    </a:schemeClr>
+                  </a:solidFill>
+                  <a:latin typeface="Poppins"/>
+                  <a:ea typeface="Poppins"/>
+                  <a:cs typeface="Poppins"/>
+                </a:rPr>
+                <a:t>1</a:t>
+              </a:r>
+              <a:endParaRPr/>
+            </a:p>
+          </p:txBody>
+        </p:sp>
+        <p:sp>
+          <p:nvSpPr>
+            <p:cNvPr id="34" name="" hidden="0"/>
+            <p:cNvSpPr/>
+            <p:nvPr isPhoto="0" userDrawn="0"/>
+          </p:nvSpPr>
+          <p:spPr bwMode="auto">
+            <a:xfrm rot="0" flipH="0" flipV="0">
+              <a:off x="1492946" y="560295"/>
+              <a:ext cx="256642" cy="320075"/>
+            </a:xfrm>
+            <a:prstGeom prst="rect">
+              <a:avLst/>
+            </a:prstGeom>
+            <a:noFill/>
+          </p:spPr>
+          <p:txBody>
+            <a:bodyPr vertOverflow="overflow" horzOverflow="clip" vert="horz" wrap="square" lIns="91440" tIns="45720" rIns="91440" bIns="45720" numCol="1" spcCol="0" rtlCol="0" fromWordArt="0" anchor="t" anchorCtr="0" forceAA="0" upright="0" compatLnSpc="0">
+              <a:spAutoFit/>
+            </a:bodyPr>
+            <a:p>
+              <a:pPr algn="l">
+                <a:defRPr/>
+              </a:pPr>
+              <a:r>
+                <a:rPr sz="1500">
+                  <a:solidFill>
+                    <a:schemeClr val="accent4">
+                      <a:lumMod val="60000"/>
+                      <a:lumOff val="40000"/>
+                    </a:schemeClr>
+                  </a:solidFill>
+                  <a:latin typeface="Poppins"/>
+                  <a:ea typeface="Poppins"/>
+                  <a:cs typeface="Poppins"/>
+                </a:rPr>
+                <a:t>1</a:t>
+              </a:r>
+              <a:endParaRPr/>
+            </a:p>
+          </p:txBody>
+        </p:sp>
+        <p:sp>
+          <p:nvSpPr>
+            <p:cNvPr id="63" name="" hidden="0"/>
+            <p:cNvSpPr/>
+            <p:nvPr isPhoto="0" userDrawn="0"/>
+          </p:nvSpPr>
+          <p:spPr bwMode="auto">
+            <a:xfrm rot="0" flipH="0" flipV="0">
+              <a:off x="1773092" y="560295"/>
+              <a:ext cx="256678" cy="320075"/>
+            </a:xfrm>
+            <a:prstGeom prst="rect">
+              <a:avLst/>
+            </a:prstGeom>
+            <a:noFill/>
+          </p:spPr>
+          <p:txBody>
+            <a:bodyPr vertOverflow="overflow" horzOverflow="clip" vert="horz" wrap="square" lIns="91440" tIns="45720" rIns="91440" bIns="45720" numCol="1" spcCol="0" rtlCol="0" fromWordArt="0" anchor="t" anchorCtr="0" forceAA="0" upright="0" compatLnSpc="0">
+              <a:spAutoFit/>
+            </a:bodyPr>
+            <a:p>
+              <a:pPr algn="l">
+                <a:defRPr/>
+              </a:pPr>
+              <a:r>
+                <a:rPr sz="1500">
+                  <a:solidFill>
+                    <a:schemeClr val="accent4">
+                      <a:lumMod val="60000"/>
+                      <a:lumOff val="40000"/>
+                    </a:schemeClr>
+                  </a:solidFill>
+                  <a:latin typeface="Poppins"/>
+                  <a:ea typeface="Poppins"/>
+                  <a:cs typeface="Poppins"/>
+                </a:rPr>
+                <a:t>1</a:t>
+              </a:r>
+              <a:endParaRPr/>
+            </a:p>
+          </p:txBody>
+        </p:sp>
+        <p:sp>
+          <p:nvSpPr>
+            <p:cNvPr id="64" name="" hidden="0"/>
+            <p:cNvSpPr/>
+            <p:nvPr isPhoto="0" userDrawn="0"/>
+          </p:nvSpPr>
+          <p:spPr bwMode="auto">
+            <a:xfrm rot="0" flipH="0" flipV="0">
+              <a:off x="904636" y="280147"/>
+              <a:ext cx="256750" cy="320075"/>
+            </a:xfrm>
+            <a:prstGeom prst="rect">
+              <a:avLst/>
+            </a:prstGeom>
+            <a:noFill/>
+          </p:spPr>
+          <p:txBody>
+            <a:bodyPr vertOverflow="overflow" horzOverflow="clip" vert="horz" wrap="square" lIns="91440" tIns="45720" rIns="91440" bIns="45720" numCol="1" spcCol="0" rtlCol="0" fromWordArt="0" anchor="t" anchorCtr="0" forceAA="0" upright="0" compatLnSpc="0">
+              <a:spAutoFit/>
+            </a:bodyPr>
+            <a:p>
+              <a:pPr algn="l">
+                <a:defRPr/>
+              </a:pPr>
+              <a:r>
+                <a:rPr sz="1500">
+                  <a:solidFill>
+                    <a:schemeClr val="accent4">
+                      <a:lumMod val="60000"/>
+                      <a:lumOff val="40000"/>
+                    </a:schemeClr>
+                  </a:solidFill>
+                  <a:latin typeface="Poppins"/>
+                  <a:ea typeface="Poppins"/>
+                  <a:cs typeface="Poppins"/>
+                </a:rPr>
+                <a:t>2</a:t>
+              </a:r>
+              <a:endParaRPr/>
+            </a:p>
+          </p:txBody>
+        </p:sp>
+        <p:sp>
+          <p:nvSpPr>
+            <p:cNvPr id="23" name="" hidden="0"/>
+            <p:cNvSpPr/>
+            <p:nvPr isPhoto="0" userDrawn="0"/>
+          </p:nvSpPr>
+          <p:spPr bwMode="auto">
+            <a:xfrm rot="0" flipH="0" flipV="0">
+              <a:off x="316328" y="0"/>
+              <a:ext cx="256786" cy="320075"/>
+            </a:xfrm>
+            <a:prstGeom prst="rect">
+              <a:avLst/>
+            </a:prstGeom>
+            <a:noFill/>
+          </p:spPr>
+          <p:txBody>
+            <a:bodyPr vertOverflow="overflow" horzOverflow="clip" vert="horz" wrap="square" lIns="91440" tIns="45720" rIns="91440" bIns="45720" numCol="1" spcCol="0" rtlCol="0" fromWordArt="0" anchor="t" anchorCtr="0" forceAA="0" upright="0" compatLnSpc="0">
+              <a:spAutoFit/>
+            </a:bodyPr>
+            <a:p>
+              <a:pPr algn="l">
+                <a:defRPr/>
+              </a:pPr>
+              <a:r>
+                <a:rPr sz="1500">
+                  <a:solidFill>
+                    <a:schemeClr val="accent4">
+                      <a:lumMod val="60000"/>
+                      <a:lumOff val="40000"/>
+                    </a:schemeClr>
+                  </a:solidFill>
+                  <a:latin typeface="Poppins"/>
+                  <a:ea typeface="Poppins"/>
+                  <a:cs typeface="Poppins"/>
+                </a:rPr>
+                <a:t>3</a:t>
+              </a:r>
+              <a:endParaRPr/>
+            </a:p>
+          </p:txBody>
+        </p:sp>
+        <p:grpSp>
+          <p:nvGrpSpPr>
+            <p:cNvPr id="65" name="" hidden="0"/>
+            <p:cNvGrpSpPr/>
+            <p:nvPr isPhoto="0" userDrawn="0"/>
+          </p:nvGrpSpPr>
+          <p:grpSpPr bwMode="auto">
+            <a:xfrm rot="0" flipH="0" flipV="0">
+              <a:off x="36183" y="1997449"/>
+              <a:ext cx="1965574" cy="320076"/>
+              <a:chOff x="0" y="0"/>
+              <a:chExt cx="1965574" cy="320076"/>
+            </a:xfrm>
+          </p:grpSpPr>
+          <p:sp>
+            <p:nvSpPr>
+              <p:cNvPr id="66" name="" hidden="0"/>
+              <p:cNvSpPr/>
+              <p:nvPr isPhoto="0" userDrawn="0"/>
+            </p:nvSpPr>
+            <p:spPr bwMode="auto">
+              <a:xfrm rot="0" flipH="0" flipV="0">
+                <a:off x="0" y="0"/>
+                <a:ext cx="256534" cy="320075"/>
+              </a:xfrm>
+              <a:prstGeom prst="rect">
+                <a:avLst/>
+              </a:prstGeom>
+              <a:noFill/>
+            </p:spPr>
+            <p:txBody>
+              <a:bodyPr vertOverflow="overflow" horzOverflow="clip" vert="horz" wrap="square" lIns="91440" tIns="45720" rIns="91440" bIns="45720" numCol="1" spcCol="0" rtlCol="0" fromWordArt="0" anchor="t" anchorCtr="0" forceAA="0" upright="0" compatLnSpc="0">
+                <a:spAutoFit/>
+              </a:bodyPr>
+              <a:p>
+                <a:pPr algn="l">
+                  <a:defRPr/>
+                </a:pPr>
+                <a:r>
+                  <a:rPr sz="1500">
+                    <a:solidFill>
+                      <a:schemeClr val="accent1"/>
+                    </a:solidFill>
+                    <a:latin typeface="Poppins"/>
+                    <a:ea typeface="Poppins"/>
+                    <a:cs typeface="Poppins"/>
+                  </a:rPr>
+                  <a:t>1</a:t>
+                </a:r>
+                <a:endParaRPr>
+                  <a:solidFill>
+                    <a:schemeClr val="accent1"/>
+                  </a:solidFill>
+                </a:endParaRPr>
+              </a:p>
+            </p:txBody>
+          </p:sp>
+          <p:sp>
+            <p:nvSpPr>
+              <p:cNvPr id="67" name="" hidden="0"/>
+              <p:cNvSpPr/>
+              <p:nvPr isPhoto="0" userDrawn="0"/>
+            </p:nvSpPr>
+            <p:spPr bwMode="auto">
+              <a:xfrm rot="0" flipH="0" flipV="0">
+                <a:off x="280146" y="0"/>
+                <a:ext cx="256570" cy="320075"/>
+              </a:xfrm>
+              <a:prstGeom prst="rect">
+                <a:avLst/>
+              </a:prstGeom>
+              <a:noFill/>
+            </p:spPr>
+            <p:txBody>
+              <a:bodyPr vertOverflow="overflow" horzOverflow="clip" vert="horz" wrap="square" lIns="91440" tIns="45720" rIns="91440" bIns="45720" numCol="1" spcCol="0" rtlCol="0" fromWordArt="0" anchor="t" anchorCtr="0" forceAA="0" upright="0" compatLnSpc="0">
+                <a:spAutoFit/>
+              </a:bodyPr>
+              <a:p>
+                <a:pPr algn="l">
+                  <a:defRPr/>
+                </a:pPr>
+                <a:r>
+                  <a:rPr sz="1500">
+                    <a:solidFill>
+                      <a:schemeClr val="accent1"/>
+                    </a:solidFill>
+                    <a:latin typeface="Poppins"/>
+                    <a:ea typeface="Poppins"/>
+                    <a:cs typeface="Poppins"/>
+                  </a:rPr>
+                  <a:t>1</a:t>
+                </a:r>
+                <a:endParaRPr>
+                  <a:solidFill>
+                    <a:schemeClr val="accent1"/>
+                  </a:solidFill>
+                </a:endParaRPr>
+              </a:p>
+            </p:txBody>
+          </p:sp>
+          <p:sp>
+            <p:nvSpPr>
+              <p:cNvPr id="68" name="" hidden="0"/>
+              <p:cNvSpPr/>
+              <p:nvPr isPhoto="0" userDrawn="0"/>
+            </p:nvSpPr>
+            <p:spPr bwMode="auto">
+              <a:xfrm rot="0" flipH="0" flipV="0">
+                <a:off x="840440" y="0"/>
+                <a:ext cx="256606" cy="320075"/>
+              </a:xfrm>
+              <a:prstGeom prst="rect">
+                <a:avLst/>
+              </a:prstGeom>
+              <a:noFill/>
+            </p:spPr>
+            <p:txBody>
+              <a:bodyPr vertOverflow="overflow" horzOverflow="clip" vert="horz" wrap="square" lIns="91440" tIns="45720" rIns="91440" bIns="45720" numCol="1" spcCol="0" rtlCol="0" fromWordArt="0" anchor="t" anchorCtr="0" forceAA="0" upright="0" compatLnSpc="0">
+                <a:spAutoFit/>
+              </a:bodyPr>
+              <a:p>
+                <a:pPr algn="l">
+                  <a:defRPr/>
+                </a:pPr>
+                <a:r>
+                  <a:rPr sz="1500">
+                    <a:solidFill>
+                      <a:schemeClr val="accent1"/>
+                    </a:solidFill>
+                    <a:latin typeface="Poppins"/>
+                    <a:ea typeface="Poppins"/>
+                    <a:cs typeface="Poppins"/>
+                  </a:rPr>
+                  <a:t>1</a:t>
+                </a:r>
+                <a:endParaRPr>
+                  <a:solidFill>
+                    <a:schemeClr val="accent1"/>
+                  </a:solidFill>
+                </a:endParaRPr>
+              </a:p>
+            </p:txBody>
+          </p:sp>
+          <p:sp>
+            <p:nvSpPr>
+              <p:cNvPr id="69" name="" hidden="0"/>
+              <p:cNvSpPr/>
+              <p:nvPr isPhoto="0" userDrawn="0"/>
+            </p:nvSpPr>
+            <p:spPr bwMode="auto">
+              <a:xfrm rot="0" flipH="0" flipV="0">
+                <a:off x="1428748" y="0"/>
+                <a:ext cx="256642" cy="320075"/>
+              </a:xfrm>
+              <a:prstGeom prst="rect">
+                <a:avLst/>
+              </a:prstGeom>
+              <a:noFill/>
+            </p:spPr>
+            <p:txBody>
+              <a:bodyPr vertOverflow="overflow" horzOverflow="clip" vert="horz" wrap="square" lIns="91440" tIns="45720" rIns="91440" bIns="45720" numCol="1" spcCol="0" rtlCol="0" fromWordArt="0" anchor="t" anchorCtr="0" forceAA="0" upright="0" compatLnSpc="0">
+                <a:spAutoFit/>
+              </a:bodyPr>
+              <a:p>
+                <a:pPr algn="l">
+                  <a:defRPr/>
+                </a:pPr>
+                <a:r>
+                  <a:rPr sz="1500">
+                    <a:solidFill>
+                      <a:schemeClr val="accent1"/>
+                    </a:solidFill>
+                    <a:latin typeface="Poppins"/>
+                    <a:ea typeface="Poppins"/>
+                    <a:cs typeface="Poppins"/>
+                  </a:rPr>
+                  <a:t>1</a:t>
+                </a:r>
+                <a:endParaRPr>
+                  <a:solidFill>
+                    <a:schemeClr val="accent1"/>
+                  </a:solidFill>
+                </a:endParaRPr>
+              </a:p>
+            </p:txBody>
+          </p:sp>
+          <p:sp>
+            <p:nvSpPr>
+              <p:cNvPr id="70" name="" hidden="0"/>
+              <p:cNvSpPr/>
+              <p:nvPr isPhoto="0" userDrawn="0"/>
+            </p:nvSpPr>
+            <p:spPr bwMode="auto">
+              <a:xfrm rot="0" flipH="0" flipV="0">
+                <a:off x="1708895" y="0"/>
+                <a:ext cx="256678" cy="320075"/>
+              </a:xfrm>
+              <a:prstGeom prst="rect">
+                <a:avLst/>
+              </a:prstGeom>
+              <a:noFill/>
+            </p:spPr>
+            <p:txBody>
+              <a:bodyPr vertOverflow="overflow" horzOverflow="clip" vert="horz" wrap="square" lIns="91440" tIns="45720" rIns="91440" bIns="45720" numCol="1" spcCol="0" rtlCol="0" fromWordArt="0" anchor="t" anchorCtr="0" forceAA="0" upright="0" compatLnSpc="0">
+                <a:spAutoFit/>
+              </a:bodyPr>
+              <a:p>
+                <a:pPr algn="l">
+                  <a:defRPr/>
+                </a:pPr>
+                <a:r>
+                  <a:rPr sz="1500">
+                    <a:solidFill>
+                      <a:schemeClr val="accent1"/>
+                    </a:solidFill>
+                    <a:latin typeface="Poppins"/>
+                    <a:ea typeface="Poppins"/>
+                    <a:cs typeface="Poppins"/>
+                  </a:rPr>
+                  <a:t>1</a:t>
+                </a:r>
+                <a:endParaRPr>
+                  <a:solidFill>
+                    <a:schemeClr val="accent1"/>
+                  </a:solidFill>
+                </a:endParaRPr>
+              </a:p>
+            </p:txBody>
+          </p:sp>
+        </p:grpSp>
+        <p:cxnSp>
+          <p:nvCxnSpPr>
+            <p:cNvPr id="71" name="" hidden="0"/>
+            <p:cNvCxnSpPr>
+              <a:cxnSpLocks/>
+              <a:endCxn id="66" idx="0"/>
+            </p:cNvCxnSpPr>
+            <p:nvPr isPhoto="0" userDrawn="0"/>
+          </p:nvCxnSpPr>
+          <p:spPr bwMode="auto">
+            <a:xfrm rot="5399977" flipH="0" flipV="1">
+              <a:off x="-394088" y="1438910"/>
+              <a:ext cx="1117078" cy="0"/>
+            </a:xfrm>
+            <a:prstGeom prst="line">
+              <a:avLst/>
+            </a:prstGeom>
+            <a:ln w="19049" cap="flat" cmpd="sng" algn="ctr">
+              <a:solidFill>
+                <a:srgbClr val="70AD47"/>
+              </a:solidFill>
+              <a:prstDash val="dash"/>
+              <a:miter/>
+            </a:ln>
+          </p:spPr>
+          <p:style>
+            <a:lnRef idx="1">
+              <a:schemeClr val="accent1">
+                <a:shade val="50000"/>
+              </a:schemeClr>
+            </a:lnRef>
+            <a:fillRef idx="0">
+              <a:schemeClr val="accent1"/>
+            </a:fillRef>
+            <a:effectRef idx="0">
+              <a:schemeClr val="accent1"/>
+            </a:effectRef>
+            <a:fontRef idx="minor">
+              <a:schemeClr val="tx1"/>
+            </a:fontRef>
+          </p:style>
+        </p:cxnSp>
+        <p:sp>
+          <p:nvSpPr>
+            <p:cNvPr id="72" name="" hidden="0"/>
+            <p:cNvSpPr/>
+            <p:nvPr isPhoto="0" userDrawn="0"/>
+          </p:nvSpPr>
+          <p:spPr bwMode="auto">
+            <a:xfrm flipH="0" flipV="0">
+              <a:off x="0" y="1501799"/>
+              <a:ext cx="217895" cy="274356"/>
+            </a:xfrm>
+            <a:prstGeom prst="rect">
+              <a:avLst/>
+            </a:prstGeom>
+            <a:noFill/>
+          </p:spPr>
+          <p:txBody>
+            <a:bodyPr vertOverflow="overflow" horzOverflow="clip" vert="horz" wrap="square" lIns="91440" tIns="45720" rIns="91440" bIns="45720" numCol="1" spcCol="0" rtlCol="0" fromWordArt="0" anchor="t" anchorCtr="0" forceAA="0" upright="0" compatLnSpc="0">
+              <a:noAutofit/>
+            </a:bodyPr>
+            <a:p>
+              <a:pPr algn="l">
+                <a:defRPr/>
+              </a:pPr>
+              <a:r>
+                <a:rPr sz="1200" b="0">
+                  <a:solidFill>
+                    <a:srgbClr val="FF008C"/>
+                  </a:solidFill>
+                  <a:latin typeface="Poppins"/>
+                  <a:ea typeface="Poppins"/>
+                  <a:cs typeface="Poppins"/>
+                </a:rPr>
+                <a:t>1</a:t>
+              </a:r>
+              <a:endParaRPr>
+                <a:solidFill>
+                  <a:srgbClr val="FF008C"/>
+                </a:solidFill>
+              </a:endParaRPr>
+            </a:p>
+          </p:txBody>
+        </p:sp>
+        <p:sp>
+          <p:nvSpPr>
+            <p:cNvPr id="73" name="" hidden="0"/>
+            <p:cNvSpPr/>
+            <p:nvPr isPhoto="0" userDrawn="0"/>
+          </p:nvSpPr>
+          <p:spPr bwMode="auto">
+            <a:xfrm flipH="0" flipV="0">
+              <a:off x="281063" y="1349421"/>
+              <a:ext cx="217894" cy="274356"/>
+            </a:xfrm>
+            <a:prstGeom prst="rect">
+              <a:avLst/>
+            </a:prstGeom>
+            <a:noFill/>
+          </p:spPr>
+          <p:txBody>
+            <a:bodyPr vertOverflow="overflow" horzOverflow="clip" vert="horz" wrap="square" lIns="91440" tIns="45720" rIns="91440" bIns="45720" numCol="1" spcCol="0" rtlCol="0" fromWordArt="0" anchor="t" anchorCtr="0" forceAA="0" upright="0" compatLnSpc="0">
+              <a:noAutofit/>
+            </a:bodyPr>
+            <a:p>
+              <a:pPr algn="l">
+                <a:defRPr/>
+              </a:pPr>
+              <a:r>
+                <a:rPr sz="1200">
+                  <a:solidFill>
+                    <a:srgbClr val="FF008C"/>
+                  </a:solidFill>
+                </a:rPr>
+                <a:t>2</a:t>
+              </a:r>
+              <a:endParaRPr sz="1200">
+                <a:solidFill>
+                  <a:srgbClr val="FF008C"/>
+                </a:solidFill>
+              </a:endParaRPr>
+            </a:p>
+          </p:txBody>
+        </p:sp>
+        <p:sp>
+          <p:nvSpPr>
+            <p:cNvPr id="74" name="" hidden="0"/>
+            <p:cNvSpPr/>
+            <p:nvPr isPhoto="0" userDrawn="0"/>
+          </p:nvSpPr>
+          <p:spPr bwMode="auto">
+            <a:xfrm flipH="0" flipV="0">
+              <a:off x="423331" y="866798"/>
+              <a:ext cx="217894" cy="274356"/>
+            </a:xfrm>
+            <a:prstGeom prst="rect">
+              <a:avLst/>
+            </a:prstGeom>
+            <a:noFill/>
+          </p:spPr>
+          <p:txBody>
+            <a:bodyPr vertOverflow="overflow" horzOverflow="clip" vert="horz" wrap="square" lIns="91440" tIns="45720" rIns="91440" bIns="45720" numCol="1" spcCol="0" rtlCol="0" fromWordArt="0" anchor="t" anchorCtr="0" forceAA="0" upright="0" compatLnSpc="0">
+              <a:noAutofit/>
+            </a:bodyPr>
+            <a:p>
+              <a:pPr algn="l">
+                <a:defRPr/>
+              </a:pPr>
+              <a:r>
+                <a:rPr sz="1200" b="0">
+                  <a:solidFill>
+                    <a:srgbClr val="FF008C"/>
+                  </a:solidFill>
+                  <a:latin typeface="Poppins"/>
+                  <a:ea typeface="Poppins"/>
+                  <a:cs typeface="Poppins"/>
+                </a:rPr>
+                <a:t>3</a:t>
+              </a:r>
+              <a:endParaRPr>
+                <a:solidFill>
+                  <a:srgbClr val="FF008C"/>
+                </a:solidFill>
+              </a:endParaRPr>
+            </a:p>
+          </p:txBody>
+        </p:sp>
+        <p:sp>
+          <p:nvSpPr>
+            <p:cNvPr id="75" name="" hidden="0"/>
+            <p:cNvSpPr/>
+            <p:nvPr isPhoto="0" userDrawn="0"/>
+          </p:nvSpPr>
+          <p:spPr bwMode="auto">
+            <a:xfrm flipH="0" flipV="0">
+              <a:off x="793747" y="1078463"/>
+              <a:ext cx="217894" cy="274356"/>
+            </a:xfrm>
+            <a:prstGeom prst="rect">
+              <a:avLst/>
+            </a:prstGeom>
+            <a:noFill/>
+          </p:spPr>
+          <p:txBody>
+            <a:bodyPr vertOverflow="overflow" horzOverflow="clip" vert="horz" wrap="square" lIns="91440" tIns="45720" rIns="91440" bIns="45720" numCol="1" spcCol="0" rtlCol="0" fromWordArt="0" anchor="t" anchorCtr="0" forceAA="0" upright="0" compatLnSpc="0">
+              <a:noAutofit/>
+            </a:bodyPr>
+            <a:p>
+              <a:pPr algn="l">
+                <a:defRPr/>
+              </a:pPr>
+              <a:r>
+                <a:rPr sz="1200" b="0">
+                  <a:solidFill>
+                    <a:srgbClr val="FF008C"/>
+                  </a:solidFill>
+                  <a:latin typeface="Poppins"/>
+                  <a:ea typeface="Poppins"/>
+                  <a:cs typeface="Poppins"/>
+                </a:rPr>
+                <a:t>4</a:t>
+              </a:r>
+              <a:endParaRPr>
+                <a:solidFill>
+                  <a:srgbClr val="FF008C"/>
+                </a:solidFill>
+              </a:endParaRPr>
+            </a:p>
+          </p:txBody>
+        </p:sp>
+        <p:sp>
+          <p:nvSpPr>
+            <p:cNvPr id="76" name="" hidden="0"/>
+            <p:cNvSpPr/>
+            <p:nvPr isPhoto="0" userDrawn="0"/>
+          </p:nvSpPr>
+          <p:spPr bwMode="auto">
+            <a:xfrm flipH="0" flipV="0">
+              <a:off x="1137705" y="1078463"/>
+              <a:ext cx="217894" cy="274356"/>
+            </a:xfrm>
+            <a:prstGeom prst="rect">
+              <a:avLst/>
+            </a:prstGeom>
+            <a:noFill/>
+          </p:spPr>
+          <p:txBody>
+            <a:bodyPr vertOverflow="overflow" horzOverflow="clip" vert="horz" wrap="square" lIns="91440" tIns="45720" rIns="91440" bIns="45720" numCol="1" spcCol="0" rtlCol="0" fromWordArt="0" anchor="t" anchorCtr="0" forceAA="0" upright="0" compatLnSpc="0">
+              <a:noAutofit/>
+            </a:bodyPr>
+            <a:p>
+              <a:pPr algn="l">
+                <a:defRPr/>
+              </a:pPr>
+              <a:r>
+                <a:rPr sz="1200" b="0">
+                  <a:solidFill>
+                    <a:srgbClr val="FF008C"/>
+                  </a:solidFill>
+                  <a:latin typeface="Poppins"/>
+                  <a:ea typeface="Poppins"/>
+                  <a:cs typeface="Poppins"/>
+                </a:rPr>
+                <a:t>5	</a:t>
+              </a:r>
+              <a:endParaRPr>
+                <a:solidFill>
+                  <a:srgbClr val="FF008C"/>
+                </a:solidFill>
+              </a:endParaRPr>
+            </a:p>
+          </p:txBody>
+        </p:sp>
+        <p:sp>
+          <p:nvSpPr>
+            <p:cNvPr id="77" name="" hidden="0"/>
+            <p:cNvSpPr/>
+            <p:nvPr isPhoto="0" userDrawn="0"/>
+          </p:nvSpPr>
+          <p:spPr bwMode="auto">
+            <a:xfrm flipH="0" flipV="0">
+              <a:off x="1375830" y="1161823"/>
+              <a:ext cx="217894" cy="274356"/>
+            </a:xfrm>
+            <a:prstGeom prst="rect">
+              <a:avLst/>
+            </a:prstGeom>
+            <a:noFill/>
+          </p:spPr>
+          <p:txBody>
+            <a:bodyPr vertOverflow="overflow" horzOverflow="clip" vert="horz" wrap="square" lIns="91440" tIns="45720" rIns="91440" bIns="45720" numCol="1" spcCol="0" rtlCol="0" fromWordArt="0" anchor="t" anchorCtr="0" forceAA="0" upright="0" compatLnSpc="0">
+              <a:noAutofit/>
+            </a:bodyPr>
+            <a:p>
+              <a:pPr algn="l">
+                <a:defRPr/>
+              </a:pPr>
+              <a:r>
+                <a:rPr sz="1200" b="0">
+                  <a:solidFill>
+                    <a:srgbClr val="FF008C"/>
+                  </a:solidFill>
+                  <a:latin typeface="Poppins"/>
+                  <a:ea typeface="Poppins"/>
+                  <a:cs typeface="Poppins"/>
+                </a:rPr>
+                <a:t>6</a:t>
+              </a:r>
+              <a:endParaRPr>
+                <a:solidFill>
+                  <a:srgbClr val="FF008C"/>
+                </a:solidFill>
+              </a:endParaRPr>
+            </a:p>
+          </p:txBody>
+        </p:sp>
+        <p:sp>
+          <p:nvSpPr>
+            <p:cNvPr id="78" name="" hidden="0"/>
+            <p:cNvSpPr/>
+            <p:nvPr isPhoto="0" userDrawn="0"/>
+          </p:nvSpPr>
+          <p:spPr bwMode="auto">
+            <a:xfrm flipH="0" flipV="0">
+              <a:off x="1693329" y="1157838"/>
+              <a:ext cx="217894" cy="274356"/>
+            </a:xfrm>
+            <a:prstGeom prst="rect">
+              <a:avLst/>
+            </a:prstGeom>
+            <a:noFill/>
+          </p:spPr>
+          <p:txBody>
+            <a:bodyPr vertOverflow="overflow" horzOverflow="clip" vert="horz" wrap="square" lIns="91440" tIns="45720" rIns="91440" bIns="45720" numCol="1" spcCol="0" rtlCol="0" fromWordArt="0" anchor="t" anchorCtr="0" forceAA="0" upright="0" compatLnSpc="0">
+              <a:noAutofit/>
+            </a:bodyPr>
+            <a:p>
+              <a:pPr algn="l">
+                <a:defRPr/>
+              </a:pPr>
+              <a:r>
+                <a:rPr sz="1200" b="0">
+                  <a:solidFill>
+                    <a:srgbClr val="FF008C"/>
+                  </a:solidFill>
+                  <a:latin typeface="Poppins"/>
+                  <a:ea typeface="Poppins"/>
+                  <a:cs typeface="Poppins"/>
+                </a:rPr>
+                <a:t>7</a:t>
+              </a:r>
+              <a:endParaRPr>
+                <a:solidFill>
+                  <a:srgbClr val="FF008C"/>
+                </a:solidFill>
+              </a:endParaRPr>
+            </a:p>
+          </p:txBody>
+        </p:sp>
+      </p:grpSp>
+      <p:cxnSp>
+        <p:nvCxnSpPr>
+          <p:cNvPr id="79" name="" hidden="0"/>
+          <p:cNvCxnSpPr>
+            <a:cxnSpLocks/>
+          </p:cNvCxnSpPr>
+          <p:nvPr isPhoto="0" userDrawn="0"/>
+        </p:nvCxnSpPr>
+        <p:spPr bwMode="auto">
+          <a:xfrm rot="5399943" flipH="0" flipV="1">
+            <a:off x="4043273" y="822476"/>
+            <a:ext cx="1092060" cy="293252"/>
+          </a:xfrm>
+          <a:prstGeom prst="line">
+            <a:avLst/>
+          </a:prstGeom>
+          <a:ln w="19049" cap="flat" cmpd="sng" algn="ctr">
+            <a:solidFill>
+              <a:srgbClr val="70AD47"/>
+            </a:solidFill>
+            <a:prstDash val="dash"/>
+            <a:miter/>
+          </a:ln>
+        </p:spPr>
+        <p:style>
+          <a:lnRef idx="1">
+            <a:schemeClr val="accent1">
+              <a:shade val="50000"/>
+            </a:schemeClr>
+          </a:lnRef>
+          <a:fillRef idx="0">
+            <a:schemeClr val="accent1"/>
+          </a:fillRef>
+          <a:effectRef idx="0">
+            <a:schemeClr val="accent1"/>
+          </a:effectRef>
+          <a:fontRef idx="minor">
+            <a:schemeClr val="tx1"/>
+          </a:fontRef>
+        </p:style>
+      </p:cxnSp>
+      <p:cxnSp>
+        <p:nvCxnSpPr>
+          <p:cNvPr id="80" name="" hidden="0"/>
+          <p:cNvCxnSpPr>
+            <a:cxnSpLocks/>
+          </p:cNvCxnSpPr>
+          <p:nvPr isPhoto="0" userDrawn="0"/>
+        </p:nvCxnSpPr>
+        <p:spPr bwMode="auto">
+          <a:xfrm rot="5399943" flipH="0" flipV="1">
+            <a:off x="4328619" y="1405481"/>
+            <a:ext cx="1109216" cy="264994"/>
+          </a:xfrm>
+          <a:prstGeom prst="line">
+            <a:avLst/>
+          </a:prstGeom>
+          <a:ln w="19049" cap="flat" cmpd="sng" algn="ctr">
+            <a:solidFill>
+              <a:srgbClr val="70AD47"/>
+            </a:solidFill>
+            <a:prstDash val="dash"/>
+            <a:miter/>
+          </a:ln>
+        </p:spPr>
+        <p:style>
+          <a:lnRef idx="1">
+            <a:schemeClr val="accent1">
+              <a:shade val="50000"/>
+            </a:schemeClr>
+          </a:lnRef>
+          <a:fillRef idx="0">
+            <a:schemeClr val="accent1"/>
+          </a:fillRef>
+          <a:effectRef idx="0">
+            <a:schemeClr val="accent1"/>
+          </a:effectRef>
+          <a:fontRef idx="minor">
+            <a:schemeClr val="tx1"/>
+          </a:fontRef>
+        </p:style>
+      </p:cxnSp>
+      <p:cxnSp>
+        <p:nvCxnSpPr>
+          <p:cNvPr id="81" name="" hidden="0"/>
+          <p:cNvCxnSpPr>
+            <a:cxnSpLocks/>
+          </p:cNvCxnSpPr>
+          <p:nvPr isPhoto="0" userDrawn="0"/>
+        </p:nvCxnSpPr>
+        <p:spPr bwMode="auto">
+          <a:xfrm rot="5399943" flipH="0" flipV="1">
+            <a:off x="4591829" y="1097190"/>
+            <a:ext cx="1127589" cy="279797"/>
+          </a:xfrm>
+          <a:prstGeom prst="line">
+            <a:avLst/>
+          </a:prstGeom>
+          <a:ln w="19049" cap="flat" cmpd="sng" algn="ctr">
+            <a:solidFill>
+              <a:srgbClr val="70AD47"/>
+            </a:solidFill>
+            <a:prstDash val="dash"/>
+            <a:miter/>
+          </a:ln>
+        </p:spPr>
+        <p:style>
+          <a:lnRef idx="1">
+            <a:schemeClr val="accent1">
+              <a:shade val="50000"/>
+            </a:schemeClr>
+          </a:lnRef>
+          <a:fillRef idx="0">
+            <a:schemeClr val="accent1"/>
+          </a:fillRef>
+          <a:effectRef idx="0">
+            <a:schemeClr val="accent1"/>
+          </a:effectRef>
+          <a:fontRef idx="minor">
+            <a:schemeClr val="tx1"/>
+          </a:fontRef>
+        </p:style>
+      </p:cxnSp>
+      <p:cxnSp>
+        <p:nvCxnSpPr>
+          <p:cNvPr id="82" name="" hidden="0"/>
+          <p:cNvCxnSpPr>
+            <a:cxnSpLocks/>
+          </p:cNvCxnSpPr>
+          <p:nvPr isPhoto="0" userDrawn="0"/>
+        </p:nvCxnSpPr>
+        <p:spPr bwMode="auto">
+          <a:xfrm rot="5399943" flipH="0" flipV="1">
+            <a:off x="4894526" y="1399886"/>
+            <a:ext cx="1109216" cy="276183"/>
+          </a:xfrm>
+          <a:prstGeom prst="line">
+            <a:avLst/>
+          </a:prstGeom>
+          <a:ln w="19049" cap="flat" cmpd="sng" algn="ctr">
+            <a:solidFill>
+              <a:srgbClr val="70AD47"/>
+            </a:solidFill>
+            <a:prstDash val="dash"/>
+            <a:miter/>
+          </a:ln>
+        </p:spPr>
+        <p:style>
+          <a:lnRef idx="1">
+            <a:schemeClr val="accent1">
+              <a:shade val="50000"/>
+            </a:schemeClr>
+          </a:lnRef>
+          <a:fillRef idx="0">
+            <a:schemeClr val="accent1"/>
+          </a:fillRef>
+          <a:effectRef idx="0">
+            <a:schemeClr val="accent1"/>
+          </a:effectRef>
+          <a:fontRef idx="minor">
+            <a:schemeClr val="tx1"/>
+          </a:fontRef>
+        </p:style>
+      </p:cxnSp>
+      <p:cxnSp>
+        <p:nvCxnSpPr>
+          <p:cNvPr id="83" name="" hidden="0"/>
+          <p:cNvCxnSpPr>
+            <a:cxnSpLocks/>
+          </p:cNvCxnSpPr>
+          <p:nvPr isPhoto="0" userDrawn="0"/>
+        </p:nvCxnSpPr>
+        <p:spPr bwMode="auto">
+          <a:xfrm rot="5399943" flipH="0" flipV="1">
+            <a:off x="5191490" y="1411102"/>
+            <a:ext cx="1103265" cy="247800"/>
+          </a:xfrm>
+          <a:prstGeom prst="line">
+            <a:avLst/>
+          </a:prstGeom>
+          <a:ln w="19049" cap="flat" cmpd="sng" algn="ctr">
+            <a:solidFill>
+              <a:srgbClr val="70AD47"/>
+            </a:solidFill>
+            <a:prstDash val="dash"/>
+            <a:miter/>
+          </a:ln>
+        </p:spPr>
+        <p:style>
+          <a:lnRef idx="1">
+            <a:schemeClr val="accent1">
+              <a:shade val="50000"/>
+            </a:schemeClr>
+          </a:lnRef>
+          <a:fillRef idx="0">
+            <a:schemeClr val="accent1"/>
+          </a:fillRef>
+          <a:effectRef idx="0">
+            <a:schemeClr val="accent1"/>
+          </a:effectRef>
+          <a:fontRef idx="minor">
+            <a:schemeClr val="tx1"/>
+          </a:fontRef>
+        </p:style>
+      </p:cxnSp>
+      <p:grpSp>
+        <p:nvGrpSpPr>
+          <p:cNvPr id="84" name="" hidden="0"/>
+          <p:cNvGrpSpPr/>
+          <p:nvPr isPhoto="0" userDrawn="0"/>
+        </p:nvGrpSpPr>
+        <p:grpSpPr bwMode="auto">
+          <a:xfrm rot="0" flipH="0" flipV="0">
+            <a:off x="4003153" y="109018"/>
+            <a:ext cx="2274900" cy="1063260"/>
+            <a:chOff x="0" y="0"/>
+            <a:chExt cx="2274900" cy="1063260"/>
+          </a:xfrm>
+        </p:grpSpPr>
+        <p:cxnSp>
+          <p:nvCxnSpPr>
+            <p:cNvPr id="85" name="" hidden="0"/>
+            <p:cNvCxnSpPr>
+              <a:cxnSpLocks/>
+            </p:cNvCxnSpPr>
+            <p:nvPr isPhoto="0" userDrawn="0"/>
+          </p:nvCxnSpPr>
+          <p:spPr bwMode="auto">
+            <a:xfrm rot="0" flipH="0" flipV="0">
+              <a:off x="0" y="1063260"/>
+              <a:ext cx="2274900" cy="0"/>
+            </a:xfrm>
+            <a:prstGeom prst="line">
+              <a:avLst/>
+            </a:prstGeom>
+            <a:ln w="12699" cap="flat" cmpd="sng" algn="ctr">
+              <a:solidFill>
+                <a:schemeClr val="tx1">
+                  <a:lumMod val="65098"/>
+                  <a:lumOff val="34902"/>
+                </a:schemeClr>
+              </a:solidFill>
+              <a:prstDash val="solid"/>
+              <a:miter/>
+              <a:tailEnd type="arrow" len="med"/>
+            </a:ln>
+          </p:spPr>
+          <p:style>
+            <a:lnRef idx="1">
+              <a:schemeClr val="accent1">
+                <a:shade val="50000"/>
+              </a:schemeClr>
+            </a:lnRef>
+            <a:fillRef idx="0">
+              <a:schemeClr val="accent1"/>
+            </a:fillRef>
+            <a:effectRef idx="0">
+              <a:schemeClr val="accent1"/>
+            </a:effectRef>
+            <a:fontRef idx="minor">
+              <a:schemeClr val="tx1"/>
+            </a:fontRef>
+          </p:style>
+        </p:cxnSp>
+        <p:cxnSp>
+          <p:nvCxnSpPr>
+            <p:cNvPr id="86" name="" hidden="0"/>
+            <p:cNvCxnSpPr>
+              <a:cxnSpLocks/>
+            </p:cNvCxnSpPr>
+            <p:nvPr isPhoto="0" userDrawn="0"/>
+          </p:nvCxnSpPr>
+          <p:spPr bwMode="auto">
+            <a:xfrm rot="16199934" flipH="0" flipV="0">
+              <a:off x="-531628" y="531630"/>
+              <a:ext cx="1063260" cy="0"/>
+            </a:xfrm>
+            <a:prstGeom prst="line">
+              <a:avLst/>
+            </a:prstGeom>
+            <a:ln w="12699" cap="flat" cmpd="sng" algn="ctr">
+              <a:solidFill>
+                <a:schemeClr val="tx1">
+                  <a:lumMod val="65098"/>
+                  <a:lumOff val="34902"/>
+                </a:schemeClr>
+              </a:solidFill>
+              <a:prstDash val="solid"/>
+              <a:miter/>
+              <a:tailEnd type="arrow" len="med"/>
+            </a:ln>
+          </p:spPr>
+          <p:style>
+            <a:lnRef idx="1">
+              <a:schemeClr val="accent1">
+                <a:shade val="50000"/>
+              </a:schemeClr>
+            </a:lnRef>
+            <a:fillRef idx="0">
+              <a:schemeClr val="accent1"/>
+            </a:fillRef>
+            <a:effectRef idx="0">
+              <a:schemeClr val="accent1"/>
+            </a:effectRef>
+            <a:fontRef idx="minor">
+              <a:schemeClr val="tx1"/>
+            </a:fontRef>
+          </p:style>
+        </p:cxnSp>
+        <p:sp>
+          <p:nvSpPr>
+            <p:cNvPr id="87" name="" hidden="0"/>
+            <p:cNvSpPr/>
+            <p:nvPr isPhoto="0" userDrawn="0"/>
+          </p:nvSpPr>
+          <p:spPr bwMode="auto">
+            <a:xfrm rot="0" flipH="0" flipV="0">
+              <a:off x="110970" y="813575"/>
               <a:ext cx="110970" cy="110970"/>
             </a:xfrm>
             <a:prstGeom prst="ellipse">
@@ -6002,13 +8960,13 @@
         </p:sp>
         <p:sp>
           <p:nvSpPr>
-            <p:cNvPr id="28" name="" hidden="0"/>
+            <p:cNvPr id="88" name="" hidden="0"/>
             <p:cNvSpPr/>
             <p:nvPr isPhoto="0" userDrawn="0"/>
           </p:nvSpPr>
           <p:spPr bwMode="auto">
             <a:xfrm rot="0" flipH="0" flipV="0">
-              <a:off x="396718" y="242074"/>
+              <a:off x="396717" y="242073"/>
               <a:ext cx="110970" cy="110970"/>
             </a:xfrm>
             <a:prstGeom prst="ellipse">
@@ -6051,13 +9009,13 @@
         </p:sp>
         <p:sp>
           <p:nvSpPr>
-            <p:cNvPr id="29" name="" hidden="0"/>
+            <p:cNvPr id="89" name="" hidden="0"/>
             <p:cNvSpPr/>
             <p:nvPr isPhoto="0" userDrawn="0"/>
           </p:nvSpPr>
           <p:spPr bwMode="auto">
             <a:xfrm rot="0" flipH="0" flipV="0">
-              <a:off x="682468" y="813574"/>
+              <a:off x="682467" y="813573"/>
               <a:ext cx="110970" cy="110970"/>
             </a:xfrm>
             <a:prstGeom prst="ellipse">
@@ -6100,13 +9058,13 @@
         </p:sp>
         <p:sp>
           <p:nvSpPr>
-            <p:cNvPr id="30" name="" hidden="0"/>
+            <p:cNvPr id="90" name="" hidden="0"/>
             <p:cNvSpPr/>
             <p:nvPr isPhoto="0" userDrawn="0"/>
           </p:nvSpPr>
           <p:spPr bwMode="auto">
             <a:xfrm rot="0" flipH="0" flipV="0">
-              <a:off x="968218" y="527824"/>
+              <a:off x="968217" y="527823"/>
               <a:ext cx="110970" cy="110970"/>
             </a:xfrm>
             <a:prstGeom prst="ellipse">
@@ -6149,13 +9107,13 @@
         </p:sp>
         <p:sp>
           <p:nvSpPr>
-            <p:cNvPr id="31" name="" hidden="0"/>
+            <p:cNvPr id="91" name="" hidden="0"/>
             <p:cNvSpPr/>
             <p:nvPr isPhoto="0" userDrawn="0"/>
           </p:nvSpPr>
           <p:spPr bwMode="auto">
             <a:xfrm rot="0" flipH="0" flipV="0">
-              <a:off x="1253968" y="813574"/>
+              <a:off x="1253966" y="813573"/>
               <a:ext cx="110970" cy="110970"/>
             </a:xfrm>
             <a:prstGeom prst="ellipse">
@@ -6198,13 +9156,13 @@
         </p:sp>
         <p:sp>
           <p:nvSpPr>
-            <p:cNvPr id="32" name="" hidden="0"/>
+            <p:cNvPr id="92" name="" hidden="0"/>
             <p:cNvSpPr/>
             <p:nvPr isPhoto="0" userDrawn="0"/>
           </p:nvSpPr>
           <p:spPr bwMode="auto">
             <a:xfrm rot="0" flipH="0" flipV="0">
-              <a:off x="1539718" y="813574"/>
+              <a:off x="1539716" y="813573"/>
               <a:ext cx="110970" cy="110970"/>
             </a:xfrm>
             <a:prstGeom prst="ellipse">
@@ -6247,13 +9205,13 @@
         </p:sp>
         <p:sp>
           <p:nvSpPr>
-            <p:cNvPr id="33" name="" hidden="0"/>
+            <p:cNvPr id="93" name="" hidden="0"/>
             <p:cNvSpPr/>
             <p:nvPr isPhoto="0" userDrawn="0"/>
           </p:nvSpPr>
           <p:spPr bwMode="auto">
             <a:xfrm rot="0" flipH="0" flipV="0">
-              <a:off x="1825467" y="813574"/>
+              <a:off x="1825466" y="813573"/>
               <a:ext cx="110970" cy="110970"/>
             </a:xfrm>
             <a:prstGeom prst="ellipse">
@@ -6296,7 +9254,7 @@
         </p:sp>
         <p:cxnSp>
           <p:nvCxnSpPr>
-            <p:cNvPr id="34" name="" hidden="0"/>
+            <p:cNvPr id="94" name="" hidden="0"/>
             <p:cNvCxnSpPr>
               <a:cxnSpLocks/>
             </p:cNvCxnSpPr>
@@ -6304,8 +9262,8 @@
           </p:nvCxnSpPr>
           <p:spPr bwMode="auto">
             <a:xfrm rot="0" flipH="1" flipV="0">
-              <a:off x="167231" y="304790"/>
-              <a:ext cx="291702" cy="577452"/>
+              <a:off x="167230" y="304788"/>
+              <a:ext cx="291701" cy="577451"/>
             </a:xfrm>
             <a:prstGeom prst="line">
               <a:avLst/>
@@ -6337,7 +9295,7 @@
         </p:cxnSp>
         <p:cxnSp>
           <p:nvCxnSpPr>
-            <p:cNvPr id="35" name="" hidden="0"/>
+            <p:cNvPr id="95" name="" hidden="0"/>
             <p:cNvCxnSpPr>
               <a:cxnSpLocks/>
             </p:cNvCxnSpPr>
@@ -6345,8 +9303,8 @@
           </p:nvCxnSpPr>
           <p:spPr bwMode="auto">
             <a:xfrm rot="0" flipH="0" flipV="0">
-              <a:off x="458933" y="304789"/>
-              <a:ext cx="279797" cy="577453"/>
+              <a:off x="458932" y="304788"/>
+              <a:ext cx="279796" cy="577452"/>
             </a:xfrm>
             <a:prstGeom prst="line">
               <a:avLst/>
@@ -6378,7 +9336,7 @@
         </p:cxnSp>
         <p:cxnSp>
           <p:nvCxnSpPr>
-            <p:cNvPr id="36" name="" hidden="0"/>
+            <p:cNvPr id="96" name="" hidden="0"/>
             <p:cNvCxnSpPr>
               <a:cxnSpLocks/>
             </p:cNvCxnSpPr>
@@ -6386,8 +9344,8 @@
           </p:nvCxnSpPr>
           <p:spPr bwMode="auto">
             <a:xfrm rot="0" flipH="1" flipV="0">
-              <a:off x="738730" y="590540"/>
-              <a:ext cx="279797" cy="291702"/>
+              <a:off x="738729" y="590539"/>
+              <a:ext cx="279796" cy="291701"/>
             </a:xfrm>
             <a:prstGeom prst="line">
               <a:avLst/>
@@ -6419,7 +9377,7 @@
         </p:cxnSp>
         <p:cxnSp>
           <p:nvCxnSpPr>
-            <p:cNvPr id="37" name="" hidden="0"/>
+            <p:cNvPr id="97" name="" hidden="0"/>
             <p:cNvCxnSpPr>
               <a:cxnSpLocks/>
             </p:cNvCxnSpPr>
@@ -6427,8 +9385,8 @@
           </p:nvCxnSpPr>
           <p:spPr bwMode="auto">
             <a:xfrm rot="0" flipH="0" flipV="0">
-              <a:off x="1018527" y="590539"/>
-              <a:ext cx="291702" cy="291703"/>
+              <a:off x="1018526" y="590538"/>
+              <a:ext cx="291701" cy="291702"/>
             </a:xfrm>
             <a:prstGeom prst="line">
               <a:avLst/>
@@ -6460,7 +9418,7 @@
         </p:cxnSp>
         <p:cxnSp>
           <p:nvCxnSpPr>
-            <p:cNvPr id="38" name="" hidden="0"/>
+            <p:cNvPr id="98" name="" hidden="0"/>
             <p:cNvCxnSpPr>
               <a:cxnSpLocks/>
             </p:cNvCxnSpPr>
@@ -6468,8 +9426,8 @@
           </p:nvCxnSpPr>
           <p:spPr bwMode="auto">
             <a:xfrm rot="0" flipH="1" flipV="0">
-              <a:off x="1310230" y="876290"/>
-              <a:ext cx="279797" cy="5952"/>
+              <a:off x="1310229" y="876289"/>
+              <a:ext cx="279796" cy="5951"/>
             </a:xfrm>
             <a:prstGeom prst="line">
               <a:avLst/>
@@ -6501,7 +9459,7 @@
         </p:cxnSp>
         <p:cxnSp>
           <p:nvCxnSpPr>
-            <p:cNvPr id="39" name="" hidden="0"/>
+            <p:cNvPr id="99" name="" hidden="0"/>
             <p:cNvCxnSpPr>
               <a:cxnSpLocks/>
             </p:cNvCxnSpPr>
@@ -6509,8 +9467,8 @@
           </p:nvCxnSpPr>
           <p:spPr bwMode="auto">
             <a:xfrm rot="0" flipH="0" flipV="1">
-              <a:off x="1590027" y="873854"/>
-              <a:ext cx="298146" cy="0"/>
+              <a:off x="1590026" y="873853"/>
+              <a:ext cx="298145" cy="0"/>
             </a:xfrm>
             <a:prstGeom prst="line">
               <a:avLst/>
@@ -6543,7 +9501,7 @@
       </p:grpSp>
       <p:cxnSp>
         <p:nvCxnSpPr>
-          <p:cNvPr id="40" name="" hidden="0"/>
+          <p:cNvPr id="100" name="" hidden="0"/>
           <p:cNvCxnSpPr>
             <a:cxnSpLocks/>
           </p:cNvCxnSpPr>
@@ -6551,8 +9509,8 @@
         </p:nvCxnSpPr>
         <p:spPr bwMode="auto">
           <a:xfrm rot="0" flipH="0" flipV="0">
-            <a:off x="6171219" y="3455891"/>
-            <a:ext cx="2274901" cy="0"/>
+            <a:off x="4003152" y="2273607"/>
+            <a:ext cx="2274900" cy="0"/>
           </a:xfrm>
           <a:prstGeom prst="line">
             <a:avLst/>
@@ -6588,15 +9546,15 @@
       </p:cxnSp>
       <p:cxnSp>
         <p:nvCxnSpPr>
-          <p:cNvPr id="41" name="" hidden="0"/>
+          <p:cNvPr id="101" name="" hidden="0"/>
           <p:cNvCxnSpPr>
             <a:cxnSpLocks/>
           </p:cNvCxnSpPr>
           <p:nvPr isPhoto="0" userDrawn="0"/>
         </p:nvCxnSpPr>
         <p:spPr bwMode="auto">
-          <a:xfrm rot="16199969" flipH="0" flipV="0">
-            <a:off x="5639590" y="2924260"/>
+          <a:xfrm rot="16199934" flipH="0" flipV="0">
+            <a:off x="3471525" y="1741976"/>
             <a:ext cx="1063260" cy="0"/>
           </a:xfrm>
           <a:prstGeom prst="line">
@@ -6633,13 +9591,13 @@
       </p:cxnSp>
       <p:sp>
         <p:nvSpPr>
-          <p:cNvPr id="42" name="" hidden="0"/>
+          <p:cNvPr id="102" name="" hidden="0"/>
           <p:cNvSpPr/>
           <p:nvPr isPhoto="0" userDrawn="0"/>
         </p:nvSpPr>
         <p:spPr bwMode="auto">
           <a:xfrm rot="0" flipH="0" flipV="0">
-            <a:off x="6556033" y="3206206"/>
+            <a:off x="4387966" y="2023921"/>
             <a:ext cx="110970" cy="110970"/>
           </a:xfrm>
           <a:prstGeom prst="ellipse">
@@ -6682,13 +9640,13 @@
       </p:sp>
       <p:sp>
         <p:nvSpPr>
-          <p:cNvPr id="43" name="" hidden="0"/>
+          <p:cNvPr id="103" name="" hidden="0"/>
           <p:cNvSpPr/>
           <p:nvPr isPhoto="0" userDrawn="0"/>
         </p:nvSpPr>
         <p:spPr bwMode="auto">
           <a:xfrm rot="0" flipH="0" flipV="0">
-            <a:off x="6841782" y="2634704"/>
+            <a:off x="4673715" y="1452420"/>
             <a:ext cx="110970" cy="110970"/>
           </a:xfrm>
           <a:prstGeom prst="ellipse">
@@ -6731,13 +9689,13 @@
       </p:sp>
       <p:sp>
         <p:nvSpPr>
-          <p:cNvPr id="44" name="" hidden="0"/>
+          <p:cNvPr id="104" name="" hidden="0"/>
           <p:cNvSpPr/>
           <p:nvPr isPhoto="0" userDrawn="0"/>
         </p:nvSpPr>
         <p:spPr bwMode="auto">
           <a:xfrm rot="0" flipH="0" flipV="0">
-            <a:off x="7127532" y="3206204"/>
+            <a:off x="4959465" y="2023920"/>
             <a:ext cx="110970" cy="110970"/>
           </a:xfrm>
           <a:prstGeom prst="ellipse">
@@ -6780,13 +9738,13 @@
       </p:sp>
       <p:sp>
         <p:nvSpPr>
-          <p:cNvPr id="45" name="" hidden="0"/>
+          <p:cNvPr id="105" name="" hidden="0"/>
           <p:cNvSpPr/>
           <p:nvPr isPhoto="0" userDrawn="0"/>
         </p:nvSpPr>
         <p:spPr bwMode="auto">
           <a:xfrm rot="0" flipH="0" flipV="0">
-            <a:off x="7413282" y="2920454"/>
+            <a:off x="5245215" y="1738170"/>
             <a:ext cx="110970" cy="110970"/>
           </a:xfrm>
           <a:prstGeom prst="ellipse">
@@ -6829,13 +9787,13 @@
       </p:sp>
       <p:sp>
         <p:nvSpPr>
-          <p:cNvPr id="46" name="" hidden="0"/>
+          <p:cNvPr id="106" name="" hidden="0"/>
           <p:cNvSpPr/>
           <p:nvPr isPhoto="0" userDrawn="0"/>
         </p:nvSpPr>
         <p:spPr bwMode="auto">
           <a:xfrm rot="0" flipH="0" flipV="0">
-            <a:off x="7699032" y="3206204"/>
+            <a:off x="5530965" y="2023920"/>
             <a:ext cx="110970" cy="110970"/>
           </a:xfrm>
           <a:prstGeom prst="ellipse">
@@ -6878,13 +9836,13 @@
       </p:sp>
       <p:sp>
         <p:nvSpPr>
-          <p:cNvPr id="47" name="" hidden="0"/>
+          <p:cNvPr id="107" name="" hidden="0"/>
           <p:cNvSpPr/>
           <p:nvPr isPhoto="0" userDrawn="0"/>
         </p:nvSpPr>
         <p:spPr bwMode="auto">
           <a:xfrm rot="0" flipH="0" flipV="0">
-            <a:off x="7984782" y="3206204"/>
+            <a:off x="5816715" y="2023920"/>
             <a:ext cx="110970" cy="110970"/>
           </a:xfrm>
           <a:prstGeom prst="ellipse">
@@ -6927,13 +9885,13 @@
       </p:sp>
       <p:sp>
         <p:nvSpPr>
-          <p:cNvPr id="48" name="" hidden="0"/>
+          <p:cNvPr id="108" name="" hidden="0"/>
           <p:cNvSpPr/>
           <p:nvPr isPhoto="0" userDrawn="0"/>
         </p:nvSpPr>
         <p:spPr bwMode="auto">
           <a:xfrm rot="0" flipH="0" flipV="0">
-            <a:off x="6274969" y="3219388"/>
+            <a:off x="4106901" y="2037103"/>
             <a:ext cx="110970" cy="110970"/>
           </a:xfrm>
           <a:prstGeom prst="ellipse">
@@ -6976,7 +9934,7 @@
       </p:sp>
       <p:cxnSp>
         <p:nvCxnSpPr>
-          <p:cNvPr id="49" name="" hidden="0"/>
+          <p:cNvPr id="109" name="" hidden="0"/>
           <p:cNvCxnSpPr>
             <a:cxnSpLocks/>
           </p:cNvCxnSpPr>
@@ -6984,8 +9942,8 @@
         </p:nvCxnSpPr>
         <p:spPr bwMode="auto">
           <a:xfrm rot="0" flipH="1" flipV="0">
-            <a:off x="6612294" y="2697420"/>
-            <a:ext cx="291702" cy="577452"/>
+            <a:off x="4444227" y="1515136"/>
+            <a:ext cx="291701" cy="577451"/>
           </a:xfrm>
           <a:prstGeom prst="line">
             <a:avLst/>
@@ -7017,7 +9975,7 @@
       </p:cxnSp>
       <p:cxnSp>
         <p:nvCxnSpPr>
-          <p:cNvPr id="13" name="" hidden="0"/>
+          <p:cNvPr id="110" name="" hidden="0"/>
           <p:cNvCxnSpPr>
             <a:cxnSpLocks/>
           </p:cNvCxnSpPr>
@@ -7025,8 +9983,8 @@
         </p:nvCxnSpPr>
         <p:spPr bwMode="auto">
           <a:xfrm rot="0" flipH="0" flipV="0">
-            <a:off x="6903997" y="2697419"/>
-            <a:ext cx="279796" cy="577452"/>
+            <a:off x="4735929" y="1515135"/>
+            <a:ext cx="279795" cy="577451"/>
           </a:xfrm>
           <a:prstGeom prst="line">
             <a:avLst/>
@@ -7058,7 +10016,7 @@
       </p:cxnSp>
       <p:cxnSp>
         <p:nvCxnSpPr>
-          <p:cNvPr id="16" name="" hidden="0"/>
+          <p:cNvPr id="111" name="" hidden="0"/>
           <p:cNvCxnSpPr>
             <a:cxnSpLocks/>
           </p:cNvCxnSpPr>
@@ -7066,8 +10024,8 @@
         </p:nvCxnSpPr>
         <p:spPr bwMode="auto">
           <a:xfrm rot="0" flipH="1" flipV="0">
-            <a:off x="7183794" y="2983170"/>
-            <a:ext cx="279796" cy="291701"/>
+            <a:off x="5015727" y="1800886"/>
+            <a:ext cx="279795" cy="291700"/>
           </a:xfrm>
           <a:prstGeom prst="line">
             <a:avLst/>
@@ -7099,7 +10057,7 @@
       </p:cxnSp>
       <p:cxnSp>
         <p:nvCxnSpPr>
-          <p:cNvPr id="18" name="" hidden="0"/>
+          <p:cNvPr id="112" name="" hidden="0"/>
           <p:cNvCxnSpPr>
             <a:cxnSpLocks/>
           </p:cNvCxnSpPr>
@@ -7107,8 +10065,8 @@
         </p:nvCxnSpPr>
         <p:spPr bwMode="auto">
           <a:xfrm rot="0" flipH="0" flipV="0">
-            <a:off x="7463591" y="2983169"/>
-            <a:ext cx="291702" cy="291702"/>
+            <a:off x="5295524" y="1800885"/>
+            <a:ext cx="291701" cy="291701"/>
           </a:xfrm>
           <a:prstGeom prst="line">
             <a:avLst/>
@@ -7140,7 +10098,7 @@
       </p:cxnSp>
       <p:cxnSp>
         <p:nvCxnSpPr>
-          <p:cNvPr id="21" name="" hidden="0"/>
+          <p:cNvPr id="113" name="" hidden="0"/>
           <p:cNvCxnSpPr>
             <a:cxnSpLocks/>
           </p:cNvCxnSpPr>
@@ -7148,8 +10106,8 @@
         </p:nvCxnSpPr>
         <p:spPr bwMode="auto">
           <a:xfrm rot="0" flipH="1" flipV="0">
-            <a:off x="7755294" y="3268920"/>
-            <a:ext cx="279796" cy="5951"/>
+            <a:off x="5587225" y="2086636"/>
+            <a:ext cx="279795" cy="5950"/>
           </a:xfrm>
           <a:prstGeom prst="line">
             <a:avLst/>
@@ -7181,17 +10139,16 @@
       </p:cxnSp>
       <p:cxnSp>
         <p:nvCxnSpPr>
-          <p:cNvPr id="10" name="" hidden="0"/>
+          <p:cNvPr id="114" name="" hidden="0"/>
           <p:cNvCxnSpPr>
             <a:cxnSpLocks/>
-            <a:stCxn id="49" idx="1"/>
           </p:cNvCxnSpPr>
           <p:nvPr isPhoto="0" userDrawn="0"/>
         </p:nvCxnSpPr>
         <p:spPr bwMode="auto">
-          <a:xfrm rot="16199969" flipH="1" flipV="1">
-            <a:off x="6474984" y="3139961"/>
-            <a:ext cx="0" cy="274618"/>
+          <a:xfrm rot="16199934" flipH="1" flipV="1">
+            <a:off x="4306917" y="1957677"/>
+            <a:ext cx="0" cy="274617"/>
           </a:xfrm>
           <a:prstGeom prst="line">
             <a:avLst/>
@@ -7223,14 +10180,14 @@
       </p:cxnSp>
       <p:sp>
         <p:nvSpPr>
-          <p:cNvPr id="50" name="" hidden="0"/>
+          <p:cNvPr id="115" name="" hidden="0"/>
           <p:cNvSpPr/>
           <p:nvPr isPhoto="0" userDrawn="0"/>
         </p:nvSpPr>
         <p:spPr bwMode="auto">
           <a:xfrm rot="0" flipH="0" flipV="0">
-            <a:off x="7322791" y="2994181"/>
-            <a:ext cx="256750" cy="320075"/>
+            <a:off x="5154725" y="1811897"/>
+            <a:ext cx="256785" cy="320075"/>
           </a:xfrm>
           <a:prstGeom prst="rect">
             <a:avLst/>
@@ -7266,14 +10223,14 @@
       </p:sp>
       <p:sp>
         <p:nvSpPr>
-          <p:cNvPr id="51" name="" hidden="0"/>
+          <p:cNvPr id="116" name="" hidden="0"/>
           <p:cNvSpPr/>
           <p:nvPr isPhoto="0" userDrawn="0"/>
         </p:nvSpPr>
         <p:spPr bwMode="auto">
           <a:xfrm rot="0" flipH="0" flipV="0">
-            <a:off x="6762496" y="2798078"/>
-            <a:ext cx="256786" cy="320075"/>
+            <a:off x="4594430" y="1615793"/>
+            <a:ext cx="256821" cy="320075"/>
           </a:xfrm>
           <a:prstGeom prst="rect">
             <a:avLst/>
@@ -7309,14 +10266,14 @@
       </p:sp>
       <p:sp>
         <p:nvSpPr>
-          <p:cNvPr id="9" name="" hidden="0"/>
+          <p:cNvPr id="117" name="" hidden="0"/>
           <p:cNvSpPr/>
           <p:nvPr isPhoto="0" userDrawn="0"/>
         </p:nvSpPr>
         <p:spPr bwMode="auto">
           <a:xfrm rot="0" flipH="0" flipV="0">
-            <a:off x="6202204" y="1845578"/>
-            <a:ext cx="256534" cy="320075"/>
+            <a:off x="4034136" y="663294"/>
+            <a:ext cx="256569" cy="320075"/>
           </a:xfrm>
           <a:prstGeom prst="rect">
             <a:avLst/>
@@ -7351,14 +10308,14 @@
       </p:sp>
       <p:sp>
         <p:nvSpPr>
-          <p:cNvPr id="15" name="" hidden="0"/>
+          <p:cNvPr id="118" name="" hidden="0"/>
           <p:cNvSpPr/>
           <p:nvPr isPhoto="0" userDrawn="0"/>
         </p:nvSpPr>
         <p:spPr bwMode="auto">
           <a:xfrm rot="0" flipH="0" flipV="0">
-            <a:off x="6790513" y="1845578"/>
-            <a:ext cx="256570" cy="320075"/>
+            <a:off x="4622446" y="663294"/>
+            <a:ext cx="256605" cy="320075"/>
           </a:xfrm>
           <a:prstGeom prst="rect">
             <a:avLst/>
@@ -7393,14 +10350,14 @@
       </p:sp>
       <p:sp>
         <p:nvSpPr>
-          <p:cNvPr id="20" name="" hidden="0"/>
+          <p:cNvPr id="119" name="" hidden="0"/>
           <p:cNvSpPr/>
           <p:nvPr isPhoto="0" userDrawn="0"/>
         </p:nvSpPr>
         <p:spPr bwMode="auto">
           <a:xfrm rot="0" flipH="0" flipV="0">
-            <a:off x="7350806" y="1845578"/>
-            <a:ext cx="256606" cy="320075"/>
+            <a:off x="5182738" y="663294"/>
+            <a:ext cx="256641" cy="320075"/>
           </a:xfrm>
           <a:prstGeom prst="rect">
             <a:avLst/>
@@ -7435,14 +10392,14 @@
       </p:sp>
       <p:sp>
         <p:nvSpPr>
-          <p:cNvPr id="23" name="" hidden="0"/>
+          <p:cNvPr id="120" name="" hidden="0"/>
           <p:cNvSpPr/>
           <p:nvPr isPhoto="0" userDrawn="0"/>
         </p:nvSpPr>
         <p:spPr bwMode="auto">
           <a:xfrm rot="0" flipH="0" flipV="0">
-            <a:off x="7658968" y="1845578"/>
-            <a:ext cx="256642" cy="320075"/>
+            <a:off x="5490901" y="663294"/>
+            <a:ext cx="256677" cy="320075"/>
           </a:xfrm>
           <a:prstGeom prst="rect">
             <a:avLst/>
@@ -7477,14 +10434,14 @@
       </p:sp>
       <p:sp>
         <p:nvSpPr>
-          <p:cNvPr id="52" name="" hidden="0"/>
+          <p:cNvPr id="121" name="" hidden="0"/>
           <p:cNvSpPr/>
           <p:nvPr isPhoto="0" userDrawn="0"/>
         </p:nvSpPr>
         <p:spPr bwMode="auto">
           <a:xfrm rot="0" flipH="0" flipV="0">
-            <a:off x="7939114" y="1845578"/>
-            <a:ext cx="256678" cy="320075"/>
+            <a:off x="5771046" y="663294"/>
+            <a:ext cx="256713" cy="320075"/>
           </a:xfrm>
           <a:prstGeom prst="rect">
             <a:avLst/>
@@ -7519,14 +10476,14 @@
       </p:sp>
       <p:sp>
         <p:nvSpPr>
-          <p:cNvPr id="53" name="" hidden="0"/>
+          <p:cNvPr id="122" name="" hidden="0"/>
           <p:cNvSpPr/>
           <p:nvPr isPhoto="0" userDrawn="0"/>
         </p:nvSpPr>
         <p:spPr bwMode="auto">
           <a:xfrm rot="0" flipH="0" flipV="0">
-            <a:off x="7070658" y="1565431"/>
-            <a:ext cx="256750" cy="320075"/>
+            <a:off x="4902590" y="383146"/>
+            <a:ext cx="256785" cy="320075"/>
           </a:xfrm>
           <a:prstGeom prst="rect">
             <a:avLst/>
@@ -7561,14 +10518,14 @@
       </p:sp>
       <p:sp>
         <p:nvSpPr>
-          <p:cNvPr id="12" name="" hidden="0"/>
+          <p:cNvPr id="123" name="" hidden="0"/>
           <p:cNvSpPr/>
           <p:nvPr isPhoto="0" userDrawn="0"/>
         </p:nvSpPr>
         <p:spPr bwMode="auto">
           <a:xfrm rot="0" flipH="0" flipV="0">
-            <a:off x="6482349" y="1285283"/>
-            <a:ext cx="256786" cy="320075"/>
+            <a:off x="4314283" y="102999"/>
+            <a:ext cx="256821" cy="320075"/>
           </a:xfrm>
           <a:prstGeom prst="rect">
             <a:avLst/>
@@ -7603,28 +10560,28 @@
       </p:sp>
       <p:grpSp>
         <p:nvGrpSpPr>
-          <p:cNvPr id="54" name="" hidden="0"/>
+          <p:cNvPr id="124" name="" hidden="0"/>
           <p:cNvGrpSpPr/>
           <p:nvPr isPhoto="0" userDrawn="0"/>
         </p:nvGrpSpPr>
         <p:grpSpPr bwMode="auto">
           <a:xfrm rot="0" flipH="0" flipV="0">
-            <a:off x="6202204" y="3282733"/>
-            <a:ext cx="1965574" cy="320076"/>
+            <a:off x="4034138" y="2100448"/>
+            <a:ext cx="1965609" cy="320075"/>
             <a:chOff x="0" y="0"/>
-            <a:chExt cx="1965574" cy="320076"/>
+            <a:chExt cx="1965609" cy="320075"/>
           </a:xfrm>
         </p:grpSpPr>
         <p:sp>
           <p:nvSpPr>
-            <p:cNvPr id="55" name="" hidden="0"/>
+            <p:cNvPr id="125" name="" hidden="0"/>
             <p:cNvSpPr/>
             <p:nvPr isPhoto="0" userDrawn="0"/>
           </p:nvSpPr>
           <p:spPr bwMode="auto">
             <a:xfrm rot="0" flipH="0" flipV="0">
               <a:off x="0" y="0"/>
-              <a:ext cx="256534" cy="320075"/>
+              <a:ext cx="256569" cy="320075"/>
             </a:xfrm>
             <a:prstGeom prst="rect">
               <a:avLst/>
@@ -7660,14 +10617,14 @@
         </p:sp>
         <p:sp>
           <p:nvSpPr>
-            <p:cNvPr id="56" name="" hidden="0"/>
+            <p:cNvPr id="126" name="" hidden="0"/>
             <p:cNvSpPr/>
             <p:nvPr isPhoto="0" userDrawn="0"/>
           </p:nvSpPr>
           <p:spPr bwMode="auto">
             <a:xfrm rot="0" flipH="0" flipV="0">
-              <a:off x="280146" y="0"/>
-              <a:ext cx="256570" cy="320075"/>
+              <a:off x="280145" y="0"/>
+              <a:ext cx="256605" cy="320075"/>
             </a:xfrm>
             <a:prstGeom prst="rect">
               <a:avLst/>
@@ -7703,14 +10660,14 @@
         </p:sp>
         <p:sp>
           <p:nvSpPr>
-            <p:cNvPr id="57" name="" hidden="0"/>
+            <p:cNvPr id="127" name="" hidden="0"/>
             <p:cNvSpPr/>
             <p:nvPr isPhoto="0" userDrawn="0"/>
           </p:nvSpPr>
           <p:spPr bwMode="auto">
             <a:xfrm rot="0" flipH="0" flipV="0">
-              <a:off x="840440" y="0"/>
-              <a:ext cx="256606" cy="320075"/>
+              <a:off x="840439" y="0"/>
+              <a:ext cx="256641" cy="320075"/>
             </a:xfrm>
             <a:prstGeom prst="rect">
               <a:avLst/>
@@ -7746,14 +10703,14 @@
         </p:sp>
         <p:sp>
           <p:nvSpPr>
-            <p:cNvPr id="58" name="" hidden="0"/>
+            <p:cNvPr id="128" name="" hidden="0"/>
             <p:cNvSpPr/>
             <p:nvPr isPhoto="0" userDrawn="0"/>
           </p:nvSpPr>
           <p:spPr bwMode="auto">
             <a:xfrm rot="0" flipH="0" flipV="0">
-              <a:off x="1428749" y="0"/>
-              <a:ext cx="256642" cy="320075"/>
+              <a:off x="1428747" y="0"/>
+              <a:ext cx="256677" cy="320075"/>
             </a:xfrm>
             <a:prstGeom prst="rect">
               <a:avLst/>
@@ -7789,14 +10746,14 @@
         </p:sp>
         <p:sp>
           <p:nvSpPr>
-            <p:cNvPr id="59" name="" hidden="0"/>
+            <p:cNvPr id="129" name="" hidden="0"/>
             <p:cNvSpPr/>
             <p:nvPr isPhoto="0" userDrawn="0"/>
           </p:nvSpPr>
           <p:spPr bwMode="auto">
             <a:xfrm rot="0" flipH="0" flipV="0">
-              <a:off x="1708895" y="0"/>
-              <a:ext cx="256678" cy="320075"/>
+              <a:off x="1708894" y="0"/>
+              <a:ext cx="256713" cy="320075"/>
             </a:xfrm>
             <a:prstGeom prst="rect">
               <a:avLst/>
@@ -7831,678 +10788,6 @@
           </p:txBody>
         </p:sp>
       </p:grpSp>
-      <p:cxnSp>
-        <p:nvCxnSpPr>
-          <p:cNvPr id="60" name="" hidden="0"/>
-          <p:cNvCxnSpPr>
-            <a:cxnSpLocks/>
-            <a:endCxn id="55" idx="0"/>
-          </p:cNvCxnSpPr>
-          <p:nvPr isPhoto="0" userDrawn="0"/>
-        </p:nvCxnSpPr>
-        <p:spPr bwMode="auto">
-          <a:xfrm rot="5399978" flipH="0" flipV="1">
-            <a:off x="5771932" y="2724194"/>
-            <a:ext cx="1117078" cy="0"/>
-          </a:xfrm>
-          <a:prstGeom prst="line">
-            <a:avLst/>
-          </a:prstGeom>
-          <a:ln w="19049" cap="flat" cmpd="sng" algn="ctr">
-            <a:solidFill>
-              <a:srgbClr val="70AD47"/>
-            </a:solidFill>
-            <a:prstDash val="dash"/>
-            <a:miter/>
-          </a:ln>
-        </p:spPr>
-        <p:style>
-          <a:lnRef idx="1">
-            <a:schemeClr val="accent1">
-              <a:shade val="50000"/>
-            </a:schemeClr>
-          </a:lnRef>
-          <a:fillRef idx="0">
-            <a:schemeClr val="accent1"/>
-          </a:fillRef>
-          <a:effectRef idx="0">
-            <a:schemeClr val="accent1"/>
-          </a:effectRef>
-          <a:fontRef idx="minor">
-            <a:schemeClr val="tx1"/>
-          </a:fontRef>
-        </p:style>
-      </p:cxnSp>
-      <p:sp>
-        <p:nvSpPr>
-          <p:cNvPr id="61" name="" hidden="0"/>
-          <p:cNvSpPr/>
-          <p:nvPr isPhoto="0" userDrawn="0"/>
-        </p:nvSpPr>
-        <p:spPr bwMode="auto">
-          <a:xfrm flipH="0" flipV="0">
-            <a:off x="1514962" y="5611584"/>
-            <a:ext cx="838686" cy="430529"/>
-          </a:xfrm>
-          <a:prstGeom prst="rect">
-            <a:avLst/>
-          </a:prstGeom>
-          <a:noFill/>
-        </p:spPr>
-        <p:txBody>
-          <a:bodyPr vertOverflow="overflow" horzOverflow="clip" vert="horz" wrap="square" lIns="91440" tIns="45720" rIns="91440" bIns="45720" numCol="1" spcCol="0" rtlCol="0" fromWordArt="0" anchor="ctr" anchorCtr="0" forceAA="0" upright="0" compatLnSpc="0">
-            <a:noAutofit/>
-          </a:bodyPr>
-          <a:p>
-            <a:pPr algn="ctr">
-              <a:defRPr/>
-            </a:pPr>
-            <a:r>
-              <a:rPr b="1">
-                <a:solidFill>
-                  <a:schemeClr val="accent6"/>
-                </a:solidFill>
-                <a:latin typeface="Poppins"/>
-                <a:ea typeface="Poppins"/>
-                <a:cs typeface="Poppins"/>
-              </a:rPr>
-              <a:t>start</a:t>
-            </a:r>
-            <a:endParaRPr b="1">
-              <a:solidFill>
-                <a:schemeClr val="accent6"/>
-              </a:solidFill>
-              <a:latin typeface="Poppins"/>
-              <a:ea typeface="Poppins"/>
-              <a:cs typeface="Poppins"/>
-            </a:endParaRPr>
-          </a:p>
-        </p:txBody>
-      </p:sp>
-      <p:sp>
-        <p:nvSpPr>
-          <p:cNvPr id="62" name="" hidden="0"/>
-          <p:cNvSpPr/>
-          <p:nvPr isPhoto="0" userDrawn="0"/>
-        </p:nvSpPr>
-        <p:spPr bwMode="auto">
-          <a:xfrm flipH="0" flipV="0">
-            <a:off x="6166021" y="2787082"/>
-            <a:ext cx="217895" cy="274356"/>
-          </a:xfrm>
-          <a:prstGeom prst="rect">
-            <a:avLst/>
-          </a:prstGeom>
-          <a:noFill/>
-        </p:spPr>
-        <p:txBody>
-          <a:bodyPr vertOverflow="overflow" horzOverflow="clip" vert="horz" wrap="square" lIns="91440" tIns="45720" rIns="91440" bIns="45720" numCol="1" spcCol="0" rtlCol="0" fromWordArt="0" anchor="t" anchorCtr="0" forceAA="0" upright="0" compatLnSpc="0">
-            <a:noAutofit/>
-          </a:bodyPr>
-          <a:p>
-            <a:pPr algn="l">
-              <a:defRPr/>
-            </a:pPr>
-            <a:r>
-              <a:rPr sz="1200" b="0">
-                <a:solidFill>
-                  <a:srgbClr val="FF008C"/>
-                </a:solidFill>
-                <a:latin typeface="Poppins"/>
-                <a:ea typeface="Poppins"/>
-                <a:cs typeface="Poppins"/>
-              </a:rPr>
-              <a:t>1</a:t>
-            </a:r>
-            <a:endParaRPr>
-              <a:solidFill>
-                <a:srgbClr val="FF008C"/>
-              </a:solidFill>
-            </a:endParaRPr>
-          </a:p>
-        </p:txBody>
-      </p:sp>
-      <p:sp>
-        <p:nvSpPr>
-          <p:cNvPr id="63" name="" hidden="0"/>
-          <p:cNvSpPr/>
-          <p:nvPr isPhoto="0" userDrawn="0"/>
-        </p:nvSpPr>
-        <p:spPr bwMode="auto">
-          <a:xfrm flipH="0" flipV="0">
-            <a:off x="6447085" y="2634704"/>
-            <a:ext cx="217894" cy="274356"/>
-          </a:xfrm>
-          <a:prstGeom prst="rect">
-            <a:avLst/>
-          </a:prstGeom>
-          <a:noFill/>
-        </p:spPr>
-        <p:txBody>
-          <a:bodyPr vertOverflow="overflow" horzOverflow="clip" vert="horz" wrap="square" lIns="91440" tIns="45720" rIns="91440" bIns="45720" numCol="1" spcCol="0" rtlCol="0" fromWordArt="0" anchor="t" anchorCtr="0" forceAA="0" upright="0" compatLnSpc="0">
-            <a:noAutofit/>
-          </a:bodyPr>
-          <a:p>
-            <a:pPr algn="l">
-              <a:defRPr/>
-            </a:pPr>
-            <a:r>
-              <a:rPr sz="1200">
-                <a:solidFill>
-                  <a:srgbClr val="FF008C"/>
-                </a:solidFill>
-              </a:rPr>
-              <a:t>2</a:t>
-            </a:r>
-            <a:endParaRPr sz="1200">
-              <a:solidFill>
-                <a:srgbClr val="FF008C"/>
-              </a:solidFill>
-            </a:endParaRPr>
-          </a:p>
-        </p:txBody>
-      </p:sp>
-      <p:sp>
-        <p:nvSpPr>
-          <p:cNvPr id="64" name="" hidden="0"/>
-          <p:cNvSpPr/>
-          <p:nvPr isPhoto="0" userDrawn="0"/>
-        </p:nvSpPr>
-        <p:spPr bwMode="auto">
-          <a:xfrm flipH="0" flipV="0">
-            <a:off x="6589353" y="2152081"/>
-            <a:ext cx="217894" cy="274356"/>
-          </a:xfrm>
-          <a:prstGeom prst="rect">
-            <a:avLst/>
-          </a:prstGeom>
-          <a:noFill/>
-        </p:spPr>
-        <p:txBody>
-          <a:bodyPr vertOverflow="overflow" horzOverflow="clip" vert="horz" wrap="square" lIns="91440" tIns="45720" rIns="91440" bIns="45720" numCol="1" spcCol="0" rtlCol="0" fromWordArt="0" anchor="t" anchorCtr="0" forceAA="0" upright="0" compatLnSpc="0">
-            <a:noAutofit/>
-          </a:bodyPr>
-          <a:p>
-            <a:pPr algn="l">
-              <a:defRPr/>
-            </a:pPr>
-            <a:r>
-              <a:rPr sz="1200" b="0">
-                <a:solidFill>
-                  <a:srgbClr val="FF008C"/>
-                </a:solidFill>
-                <a:latin typeface="Poppins"/>
-                <a:ea typeface="Poppins"/>
-                <a:cs typeface="Poppins"/>
-              </a:rPr>
-              <a:t>3</a:t>
-            </a:r>
-            <a:endParaRPr>
-              <a:solidFill>
-                <a:srgbClr val="FF008C"/>
-              </a:solidFill>
-            </a:endParaRPr>
-          </a:p>
-        </p:txBody>
-      </p:sp>
-      <p:sp>
-        <p:nvSpPr>
-          <p:cNvPr id="65" name="" hidden="0"/>
-          <p:cNvSpPr/>
-          <p:nvPr isPhoto="0" userDrawn="0"/>
-        </p:nvSpPr>
-        <p:spPr bwMode="auto">
-          <a:xfrm flipH="0" flipV="0">
-            <a:off x="6959769" y="2363747"/>
-            <a:ext cx="217894" cy="274356"/>
-          </a:xfrm>
-          <a:prstGeom prst="rect">
-            <a:avLst/>
-          </a:prstGeom>
-          <a:noFill/>
-        </p:spPr>
-        <p:txBody>
-          <a:bodyPr vertOverflow="overflow" horzOverflow="clip" vert="horz" wrap="square" lIns="91440" tIns="45720" rIns="91440" bIns="45720" numCol="1" spcCol="0" rtlCol="0" fromWordArt="0" anchor="t" anchorCtr="0" forceAA="0" upright="0" compatLnSpc="0">
-            <a:noAutofit/>
-          </a:bodyPr>
-          <a:p>
-            <a:pPr algn="l">
-              <a:defRPr/>
-            </a:pPr>
-            <a:r>
-              <a:rPr sz="1200" b="0">
-                <a:solidFill>
-                  <a:srgbClr val="FF008C"/>
-                </a:solidFill>
-                <a:latin typeface="Poppins"/>
-                <a:ea typeface="Poppins"/>
-                <a:cs typeface="Poppins"/>
-              </a:rPr>
-              <a:t>4</a:t>
-            </a:r>
-            <a:endParaRPr>
-              <a:solidFill>
-                <a:srgbClr val="FF008C"/>
-              </a:solidFill>
-            </a:endParaRPr>
-          </a:p>
-        </p:txBody>
-      </p:sp>
-      <p:sp>
-        <p:nvSpPr>
-          <p:cNvPr id="66" name="" hidden="0"/>
-          <p:cNvSpPr/>
-          <p:nvPr isPhoto="0" userDrawn="0"/>
-        </p:nvSpPr>
-        <p:spPr bwMode="auto">
-          <a:xfrm flipH="0" flipV="0">
-            <a:off x="7303727" y="2363746"/>
-            <a:ext cx="217894" cy="274356"/>
-          </a:xfrm>
-          <a:prstGeom prst="rect">
-            <a:avLst/>
-          </a:prstGeom>
-          <a:noFill/>
-        </p:spPr>
-        <p:txBody>
-          <a:bodyPr vertOverflow="overflow" horzOverflow="clip" vert="horz" wrap="square" lIns="91440" tIns="45720" rIns="91440" bIns="45720" numCol="1" spcCol="0" rtlCol="0" fromWordArt="0" anchor="t" anchorCtr="0" forceAA="0" upright="0" compatLnSpc="0">
-            <a:noAutofit/>
-          </a:bodyPr>
-          <a:p>
-            <a:pPr algn="l">
-              <a:defRPr/>
-            </a:pPr>
-            <a:r>
-              <a:rPr sz="1200" b="0">
-                <a:solidFill>
-                  <a:srgbClr val="FF008C"/>
-                </a:solidFill>
-                <a:latin typeface="Poppins"/>
-                <a:ea typeface="Poppins"/>
-                <a:cs typeface="Poppins"/>
-              </a:rPr>
-              <a:t>5	</a:t>
-            </a:r>
-            <a:endParaRPr>
-              <a:solidFill>
-                <a:srgbClr val="FF008C"/>
-              </a:solidFill>
-            </a:endParaRPr>
-          </a:p>
-        </p:txBody>
-      </p:sp>
-      <p:sp>
-        <p:nvSpPr>
-          <p:cNvPr id="67" name="" hidden="0"/>
-          <p:cNvSpPr/>
-          <p:nvPr isPhoto="0" userDrawn="0"/>
-        </p:nvSpPr>
-        <p:spPr bwMode="auto">
-          <a:xfrm flipH="0" flipV="0">
-            <a:off x="7541851" y="2447107"/>
-            <a:ext cx="217894" cy="274356"/>
-          </a:xfrm>
-          <a:prstGeom prst="rect">
-            <a:avLst/>
-          </a:prstGeom>
-          <a:noFill/>
-        </p:spPr>
-        <p:txBody>
-          <a:bodyPr vertOverflow="overflow" horzOverflow="clip" vert="horz" wrap="square" lIns="91440" tIns="45720" rIns="91440" bIns="45720" numCol="1" spcCol="0" rtlCol="0" fromWordArt="0" anchor="t" anchorCtr="0" forceAA="0" upright="0" compatLnSpc="0">
-            <a:noAutofit/>
-          </a:bodyPr>
-          <a:p>
-            <a:pPr algn="l">
-              <a:defRPr/>
-            </a:pPr>
-            <a:r>
-              <a:rPr sz="1200" b="0">
-                <a:solidFill>
-                  <a:srgbClr val="FF008C"/>
-                </a:solidFill>
-                <a:latin typeface="Poppins"/>
-                <a:ea typeface="Poppins"/>
-                <a:cs typeface="Poppins"/>
-              </a:rPr>
-              <a:t>6</a:t>
-            </a:r>
-            <a:endParaRPr>
-              <a:solidFill>
-                <a:srgbClr val="FF008C"/>
-              </a:solidFill>
-            </a:endParaRPr>
-          </a:p>
-        </p:txBody>
-      </p:sp>
-      <p:sp>
-        <p:nvSpPr>
-          <p:cNvPr id="68" name="" hidden="0"/>
-          <p:cNvSpPr/>
-          <p:nvPr isPhoto="0" userDrawn="0"/>
-        </p:nvSpPr>
-        <p:spPr bwMode="auto">
-          <a:xfrm flipH="0" flipV="0">
-            <a:off x="7859350" y="2443122"/>
-            <a:ext cx="217894" cy="274356"/>
-          </a:xfrm>
-          <a:prstGeom prst="rect">
-            <a:avLst/>
-          </a:prstGeom>
-          <a:noFill/>
-        </p:spPr>
-        <p:txBody>
-          <a:bodyPr vertOverflow="overflow" horzOverflow="clip" vert="horz" wrap="square" lIns="91440" tIns="45720" rIns="91440" bIns="45720" numCol="1" spcCol="0" rtlCol="0" fromWordArt="0" anchor="t" anchorCtr="0" forceAA="0" upright="0" compatLnSpc="0">
-            <a:noAutofit/>
-          </a:bodyPr>
-          <a:p>
-            <a:pPr algn="l">
-              <a:defRPr/>
-            </a:pPr>
-            <a:r>
-              <a:rPr sz="1200" b="0">
-                <a:solidFill>
-                  <a:srgbClr val="FF008C"/>
-                </a:solidFill>
-                <a:latin typeface="Poppins"/>
-                <a:ea typeface="Poppins"/>
-                <a:cs typeface="Poppins"/>
-              </a:rPr>
-              <a:t>7</a:t>
-            </a:r>
-            <a:endParaRPr>
-              <a:solidFill>
-                <a:srgbClr val="FF008C"/>
-              </a:solidFill>
-            </a:endParaRPr>
-          </a:p>
-        </p:txBody>
-      </p:sp>
-      <p:sp>
-        <p:nvSpPr>
-          <p:cNvPr id="69" name="" hidden="0"/>
-          <p:cNvSpPr/>
-          <p:nvPr isPhoto="0" userDrawn="0"/>
-        </p:nvSpPr>
-        <p:spPr bwMode="auto">
-          <a:xfrm flipH="0" flipV="0">
-            <a:off x="1617833" y="5255645"/>
-            <a:ext cx="217895" cy="274356"/>
-          </a:xfrm>
-          <a:prstGeom prst="rect">
-            <a:avLst/>
-          </a:prstGeom>
-          <a:noFill/>
-        </p:spPr>
-        <p:txBody>
-          <a:bodyPr vertOverflow="overflow" horzOverflow="clip" vert="horz" wrap="square" lIns="91440" tIns="45720" rIns="91440" bIns="45720" numCol="1" spcCol="0" rtlCol="0" fromWordArt="0" anchor="t" anchorCtr="0" forceAA="0" upright="0" compatLnSpc="0">
-            <a:noAutofit/>
-          </a:bodyPr>
-          <a:p>
-            <a:pPr algn="l">
-              <a:defRPr/>
-            </a:pPr>
-            <a:r>
-              <a:rPr sz="1200" b="0">
-                <a:solidFill>
-                  <a:srgbClr val="FF008C"/>
-                </a:solidFill>
-                <a:latin typeface="Poppins"/>
-                <a:ea typeface="Poppins"/>
-                <a:cs typeface="Poppins"/>
-              </a:rPr>
-              <a:t>1</a:t>
-            </a:r>
-            <a:endParaRPr>
-              <a:solidFill>
-                <a:srgbClr val="FF008C"/>
-              </a:solidFill>
-            </a:endParaRPr>
-          </a:p>
-        </p:txBody>
-      </p:sp>
-      <p:sp>
-        <p:nvSpPr>
-          <p:cNvPr id="70" name="" hidden="0"/>
-          <p:cNvSpPr/>
-          <p:nvPr isPhoto="0" userDrawn="0"/>
-        </p:nvSpPr>
-        <p:spPr bwMode="auto">
-          <a:xfrm flipH="0" flipV="0">
-            <a:off x="1617833" y="4897172"/>
-            <a:ext cx="217895" cy="274356"/>
-          </a:xfrm>
-          <a:prstGeom prst="rect">
-            <a:avLst/>
-          </a:prstGeom>
-          <a:noFill/>
-        </p:spPr>
-        <p:txBody>
-          <a:bodyPr vertOverflow="overflow" horzOverflow="clip" vert="horz" wrap="square" lIns="91440" tIns="45720" rIns="91440" bIns="45720" numCol="1" spcCol="0" rtlCol="0" fromWordArt="0" anchor="t" anchorCtr="0" forceAA="0" upright="0" compatLnSpc="0">
-            <a:noAutofit/>
-          </a:bodyPr>
-          <a:p>
-            <a:pPr algn="l">
-              <a:defRPr/>
-            </a:pPr>
-            <a:r>
-              <a:rPr sz="1200">
-                <a:solidFill>
-                  <a:srgbClr val="FF008C"/>
-                </a:solidFill>
-              </a:rPr>
-              <a:t>2</a:t>
-            </a:r>
-            <a:endParaRPr sz="1200">
-              <a:solidFill>
-                <a:srgbClr val="FF008C"/>
-              </a:solidFill>
-            </a:endParaRPr>
-          </a:p>
-        </p:txBody>
-      </p:sp>
-      <p:sp>
-        <p:nvSpPr>
-          <p:cNvPr id="71" name="" hidden="0"/>
-          <p:cNvSpPr/>
-          <p:nvPr isPhoto="0" userDrawn="0"/>
-        </p:nvSpPr>
-        <p:spPr bwMode="auto">
-          <a:xfrm flipH="0" flipV="0">
-            <a:off x="2110469" y="4559927"/>
-            <a:ext cx="217895" cy="274356"/>
-          </a:xfrm>
-          <a:prstGeom prst="rect">
-            <a:avLst/>
-          </a:prstGeom>
-          <a:noFill/>
-        </p:spPr>
-        <p:txBody>
-          <a:bodyPr vertOverflow="overflow" horzOverflow="clip" vert="horz" wrap="square" lIns="91440" tIns="45720" rIns="91440" bIns="45720" numCol="1" spcCol="0" rtlCol="0" fromWordArt="0" anchor="t" anchorCtr="0" forceAA="0" upright="0" compatLnSpc="0">
-            <a:noAutofit/>
-          </a:bodyPr>
-          <a:p>
-            <a:pPr algn="l">
-              <a:defRPr/>
-            </a:pPr>
-            <a:r>
-              <a:rPr sz="1200">
-                <a:solidFill>
-                  <a:srgbClr val="FF008C"/>
-                </a:solidFill>
-              </a:rPr>
-              <a:t>3</a:t>
-            </a:r>
-            <a:endParaRPr sz="1200">
-              <a:solidFill>
-                <a:srgbClr val="FF008C"/>
-              </a:solidFill>
-            </a:endParaRPr>
-          </a:p>
-        </p:txBody>
-      </p:sp>
-      <p:sp>
-        <p:nvSpPr>
-          <p:cNvPr id="72" name="" hidden="0"/>
-          <p:cNvSpPr/>
-          <p:nvPr isPhoto="0" userDrawn="0"/>
-        </p:nvSpPr>
-        <p:spPr bwMode="auto">
-          <a:xfrm flipH="0" flipV="0">
-            <a:off x="2610531" y="4186032"/>
-            <a:ext cx="217895" cy="274356"/>
-          </a:xfrm>
-          <a:prstGeom prst="rect">
-            <a:avLst/>
-          </a:prstGeom>
-          <a:noFill/>
-        </p:spPr>
-        <p:txBody>
-          <a:bodyPr vertOverflow="overflow" horzOverflow="clip" vert="horz" wrap="square" lIns="91440" tIns="45720" rIns="91440" bIns="45720" numCol="1" spcCol="0" rtlCol="0" fromWordArt="0" anchor="t" anchorCtr="0" forceAA="0" upright="0" compatLnSpc="0">
-            <a:noAutofit/>
-          </a:bodyPr>
-          <a:p>
-            <a:pPr algn="l">
-              <a:defRPr/>
-            </a:pPr>
-            <a:r>
-              <a:rPr sz="1200" b="0">
-                <a:solidFill>
-                  <a:srgbClr val="FF008C"/>
-                </a:solidFill>
-                <a:latin typeface="Poppins"/>
-                <a:ea typeface="Poppins"/>
-                <a:cs typeface="Poppins"/>
-              </a:rPr>
-              <a:t>4</a:t>
-            </a:r>
-            <a:endParaRPr>
-              <a:solidFill>
-                <a:srgbClr val="FF008C"/>
-              </a:solidFill>
-            </a:endParaRPr>
-          </a:p>
-        </p:txBody>
-      </p:sp>
-      <p:sp>
-        <p:nvSpPr>
-          <p:cNvPr id="73" name="" hidden="0"/>
-          <p:cNvSpPr/>
-          <p:nvPr isPhoto="0" userDrawn="0"/>
-        </p:nvSpPr>
-        <p:spPr bwMode="auto">
-          <a:xfrm flipH="0" flipV="0">
-            <a:off x="3101812" y="3827634"/>
-            <a:ext cx="217895" cy="274356"/>
-          </a:xfrm>
-          <a:prstGeom prst="rect">
-            <a:avLst/>
-          </a:prstGeom>
-          <a:noFill/>
-        </p:spPr>
-        <p:txBody>
-          <a:bodyPr vertOverflow="overflow" horzOverflow="clip" vert="horz" wrap="square" lIns="91440" tIns="45720" rIns="91440" bIns="45720" numCol="1" spcCol="0" rtlCol="0" fromWordArt="0" anchor="t" anchorCtr="0" forceAA="0" upright="0" compatLnSpc="0">
-            <a:noAutofit/>
-          </a:bodyPr>
-          <a:p>
-            <a:pPr algn="l">
-              <a:defRPr/>
-            </a:pPr>
-            <a:r>
-              <a:rPr sz="1200">
-                <a:solidFill>
-                  <a:srgbClr val="FF008C"/>
-                </a:solidFill>
-              </a:rPr>
-              <a:t>5</a:t>
-            </a:r>
-            <a:endParaRPr sz="1200">
-              <a:solidFill>
-                <a:srgbClr val="FF008C"/>
-              </a:solidFill>
-            </a:endParaRPr>
-          </a:p>
-        </p:txBody>
-      </p:sp>
-      <p:sp>
-        <p:nvSpPr>
-          <p:cNvPr id="74" name="" hidden="0"/>
-          <p:cNvSpPr/>
-          <p:nvPr isPhoto="0" userDrawn="0"/>
-        </p:nvSpPr>
-        <p:spPr bwMode="auto">
-          <a:xfrm flipH="0" flipV="0">
-            <a:off x="3601874" y="3455890"/>
-            <a:ext cx="217895" cy="274356"/>
-          </a:xfrm>
-          <a:prstGeom prst="rect">
-            <a:avLst/>
-          </a:prstGeom>
-          <a:noFill/>
-        </p:spPr>
-        <p:txBody>
-          <a:bodyPr vertOverflow="overflow" horzOverflow="clip" vert="horz" wrap="square" lIns="91440" tIns="45720" rIns="91440" bIns="45720" numCol="1" spcCol="0" rtlCol="0" fromWordArt="0" anchor="t" anchorCtr="0" forceAA="0" upright="0" compatLnSpc="0">
-            <a:noAutofit/>
-          </a:bodyPr>
-          <a:p>
-            <a:pPr algn="l">
-              <a:defRPr/>
-            </a:pPr>
-            <a:r>
-              <a:rPr sz="1200">
-                <a:solidFill>
-                  <a:srgbClr val="FF008C"/>
-                </a:solidFill>
-              </a:rPr>
-              <a:t>6</a:t>
-            </a:r>
-            <a:endParaRPr sz="1200">
-              <a:solidFill>
-                <a:srgbClr val="FF008C"/>
-              </a:solidFill>
-            </a:endParaRPr>
-          </a:p>
-        </p:txBody>
-      </p:sp>
-      <p:sp>
-        <p:nvSpPr>
-          <p:cNvPr id="75" name="" hidden="0"/>
-          <p:cNvSpPr/>
-          <p:nvPr isPhoto="0" userDrawn="0"/>
-        </p:nvSpPr>
-        <p:spPr bwMode="auto">
-          <a:xfrm flipH="0" flipV="0">
-            <a:off x="4101937" y="3107180"/>
-            <a:ext cx="217895" cy="274356"/>
-          </a:xfrm>
-          <a:prstGeom prst="rect">
-            <a:avLst/>
-          </a:prstGeom>
-          <a:noFill/>
-        </p:spPr>
-        <p:txBody>
-          <a:bodyPr vertOverflow="overflow" horzOverflow="clip" vert="horz" wrap="square" lIns="91440" tIns="45720" rIns="91440" bIns="45720" numCol="1" spcCol="0" rtlCol="0" fromWordArt="0" anchor="t" anchorCtr="0" forceAA="0" upright="0" compatLnSpc="0">
-            <a:noAutofit/>
-          </a:bodyPr>
-          <a:p>
-            <a:pPr algn="l">
-              <a:defRPr/>
-            </a:pPr>
-            <a:r>
-              <a:rPr sz="1200">
-                <a:solidFill>
-                  <a:srgbClr val="FF008C"/>
-                </a:solidFill>
-              </a:rPr>
-              <a:t>7</a:t>
-            </a:r>
-            <a:endParaRPr sz="1200">
-              <a:solidFill>
-                <a:srgbClr val="FF008C"/>
-              </a:solidFill>
-            </a:endParaRPr>
-          </a:p>
-        </p:txBody>
-      </p:sp>
     </p:spTree>
   </p:cSld>
   <p:clrMapOvr>

</xml_diff>